<commit_message>
390: font is Libertine in all figures
</commit_message>
<xml_diff>
--- a/paper/images/migration_steps.pptx
+++ b/paper/images/migration_steps.pptx
@@ -197,7 +197,7 @@
           <a:p>
             <a:fld id="{AC912B93-3B02-4970-AB66-30E3EB822F31}" type="datetimeFigureOut">
               <a:rPr lang="de-DE" smtClean="0"/>
-              <a:t>09.06.2022</a:t>
+              <a:t>04.07.2022</a:t>
             </a:fld>
             <a:endParaRPr lang="de-DE"/>
           </a:p>
@@ -596,7 +596,7 @@
           <a:p>
             <a:fld id="{A293A7CC-FD0B-4DB5-A531-C203425A83EE}" type="datetimeFigureOut">
               <a:rPr lang="de-DE" smtClean="0"/>
-              <a:t>09.06.2022</a:t>
+              <a:t>04.07.2022</a:t>
             </a:fld>
             <a:endParaRPr lang="de-DE"/>
           </a:p>
@@ -766,7 +766,7 @@
           <a:p>
             <a:fld id="{A293A7CC-FD0B-4DB5-A531-C203425A83EE}" type="datetimeFigureOut">
               <a:rPr lang="de-DE" smtClean="0"/>
-              <a:t>09.06.2022</a:t>
+              <a:t>04.07.2022</a:t>
             </a:fld>
             <a:endParaRPr lang="de-DE"/>
           </a:p>
@@ -946,7 +946,7 @@
           <a:p>
             <a:fld id="{A293A7CC-FD0B-4DB5-A531-C203425A83EE}" type="datetimeFigureOut">
               <a:rPr lang="de-DE" smtClean="0"/>
-              <a:t>09.06.2022</a:t>
+              <a:t>04.07.2022</a:t>
             </a:fld>
             <a:endParaRPr lang="de-DE"/>
           </a:p>
@@ -1116,7 +1116,7 @@
           <a:p>
             <a:fld id="{A293A7CC-FD0B-4DB5-A531-C203425A83EE}" type="datetimeFigureOut">
               <a:rPr lang="de-DE" smtClean="0"/>
-              <a:t>09.06.2022</a:t>
+              <a:t>04.07.2022</a:t>
             </a:fld>
             <a:endParaRPr lang="de-DE"/>
           </a:p>
@@ -1362,7 +1362,7 @@
           <a:p>
             <a:fld id="{A293A7CC-FD0B-4DB5-A531-C203425A83EE}" type="datetimeFigureOut">
               <a:rPr lang="de-DE" smtClean="0"/>
-              <a:t>09.06.2022</a:t>
+              <a:t>04.07.2022</a:t>
             </a:fld>
             <a:endParaRPr lang="de-DE"/>
           </a:p>
@@ -1594,7 +1594,7 @@
           <a:p>
             <a:fld id="{A293A7CC-FD0B-4DB5-A531-C203425A83EE}" type="datetimeFigureOut">
               <a:rPr lang="de-DE" smtClean="0"/>
-              <a:t>09.06.2022</a:t>
+              <a:t>04.07.2022</a:t>
             </a:fld>
             <a:endParaRPr lang="de-DE"/>
           </a:p>
@@ -1961,7 +1961,7 @@
           <a:p>
             <a:fld id="{A293A7CC-FD0B-4DB5-A531-C203425A83EE}" type="datetimeFigureOut">
               <a:rPr lang="de-DE" smtClean="0"/>
-              <a:t>09.06.2022</a:t>
+              <a:t>04.07.2022</a:t>
             </a:fld>
             <a:endParaRPr lang="de-DE"/>
           </a:p>
@@ -2079,7 +2079,7 @@
           <a:p>
             <a:fld id="{A293A7CC-FD0B-4DB5-A531-C203425A83EE}" type="datetimeFigureOut">
               <a:rPr lang="de-DE" smtClean="0"/>
-              <a:t>09.06.2022</a:t>
+              <a:t>04.07.2022</a:t>
             </a:fld>
             <a:endParaRPr lang="de-DE"/>
           </a:p>
@@ -2174,7 +2174,7 @@
           <a:p>
             <a:fld id="{A293A7CC-FD0B-4DB5-A531-C203425A83EE}" type="datetimeFigureOut">
               <a:rPr lang="de-DE" smtClean="0"/>
-              <a:t>09.06.2022</a:t>
+              <a:t>04.07.2022</a:t>
             </a:fld>
             <a:endParaRPr lang="de-DE"/>
           </a:p>
@@ -2451,7 +2451,7 @@
           <a:p>
             <a:fld id="{A293A7CC-FD0B-4DB5-A531-C203425A83EE}" type="datetimeFigureOut">
               <a:rPr lang="de-DE" smtClean="0"/>
-              <a:t>09.06.2022</a:t>
+              <a:t>04.07.2022</a:t>
             </a:fld>
             <a:endParaRPr lang="de-DE"/>
           </a:p>
@@ -2704,7 +2704,7 @@
           <a:p>
             <a:fld id="{A293A7CC-FD0B-4DB5-A531-C203425A83EE}" type="datetimeFigureOut">
               <a:rPr lang="de-DE" smtClean="0"/>
-              <a:t>09.06.2022</a:t>
+              <a:t>04.07.2022</a:t>
             </a:fld>
             <a:endParaRPr lang="de-DE"/>
           </a:p>
@@ -2917,7 +2917,7 @@
           <a:p>
             <a:fld id="{A293A7CC-FD0B-4DB5-A531-C203425A83EE}" type="datetimeFigureOut">
               <a:rPr lang="de-DE" smtClean="0"/>
-              <a:t>09.06.2022</a:t>
+              <a:t>04.07.2022</a:t>
             </a:fld>
             <a:endParaRPr lang="de-DE"/>
           </a:p>
@@ -3690,6 +3690,9 @@
                 <a:solidFill>
                   <a:schemeClr val="tx1"/>
                 </a:solidFill>
+                <a:latin typeface="Linux Libertine" panose="02000503000000000000" pitchFamily="2" charset="0"/>
+                <a:ea typeface="Linux Libertine" panose="02000503000000000000" pitchFamily="2" charset="0"/>
+                <a:cs typeface="Linux Libertine" panose="02000503000000000000" pitchFamily="2" charset="0"/>
               </a:endParaRPr>
             </a:p>
           </p:txBody>
@@ -3702,8 +3705,8 @@
           </p:nvSpPr>
           <p:spPr>
             <a:xfrm rot="16200000">
-              <a:off x="9769634" y="4796835"/>
-              <a:ext cx="573427" cy="307777"/>
+              <a:off x="9749212" y="4796835"/>
+              <a:ext cx="614271" cy="307777"/>
             </a:xfrm>
             <a:prstGeom prst="rect">
               <a:avLst/>
@@ -3716,14 +3719,26 @@
             <a:lstStyle/>
             <a:p>
               <a:r>
-                <a:rPr lang="de-DE" sz="1100" b="1" dirty="0" smtClean="0"/>
+                <a:rPr lang="de-DE" sz="1100" b="1" dirty="0" smtClean="0">
+                  <a:latin typeface="Linux Libertine" panose="02000503000000000000" pitchFamily="2" charset="0"/>
+                  <a:ea typeface="Linux Libertine" panose="02000503000000000000" pitchFamily="2" charset="0"/>
+                  <a:cs typeface="Linux Libertine" panose="02000503000000000000" pitchFamily="2" charset="0"/>
+                </a:rPr>
                 <a:t># </a:t>
               </a:r>
               <a:r>
-                <a:rPr lang="de-DE" sz="1400" b="1" dirty="0" smtClean="0"/>
+                <a:rPr lang="de-DE" sz="1400" b="1" dirty="0" smtClean="0">
+                  <a:latin typeface="Linux Libertine" panose="02000503000000000000" pitchFamily="2" charset="0"/>
+                  <a:ea typeface="Linux Libertine" panose="02000503000000000000" pitchFamily="2" charset="0"/>
+                  <a:cs typeface="Linux Libertine" panose="02000503000000000000" pitchFamily="2" charset="0"/>
+                </a:rPr>
                 <a:t>LOC</a:t>
               </a:r>
-              <a:endParaRPr lang="en-US" sz="1400" b="1" dirty="0"/>
+              <a:endParaRPr lang="en-US" sz="1400" b="1" dirty="0">
+                <a:latin typeface="Linux Libertine" panose="02000503000000000000" pitchFamily="2" charset="0"/>
+                <a:ea typeface="Linux Libertine" panose="02000503000000000000" pitchFamily="2" charset="0"/>
+                <a:cs typeface="Linux Libertine" panose="02000503000000000000" pitchFamily="2" charset="0"/>
+              </a:endParaRPr>
             </a:p>
           </p:txBody>
         </p:sp>
@@ -3906,6 +3921,9 @@
                 <a:solidFill>
                   <a:schemeClr val="tx1"/>
                 </a:solidFill>
+                <a:latin typeface="Linux Libertine" panose="02000503000000000000" pitchFamily="2" charset="0"/>
+                <a:ea typeface="Linux Libertine" panose="02000503000000000000" pitchFamily="2" charset="0"/>
+                <a:cs typeface="Linux Libertine" panose="02000503000000000000" pitchFamily="2" charset="0"/>
               </a:endParaRPr>
             </a:p>
           </p:txBody>
@@ -3956,6 +3974,9 @@
                 <a:solidFill>
                   <a:schemeClr val="tx1"/>
                 </a:solidFill>
+                <a:latin typeface="Linux Libertine" panose="02000503000000000000" pitchFamily="2" charset="0"/>
+                <a:ea typeface="Linux Libertine" panose="02000503000000000000" pitchFamily="2" charset="0"/>
+                <a:cs typeface="Linux Libertine" panose="02000503000000000000" pitchFamily="2" charset="0"/>
               </a:endParaRPr>
             </a:p>
           </p:txBody>
@@ -4138,6 +4159,9 @@
               <a:solidFill>
                 <a:schemeClr val="tx1"/>
               </a:solidFill>
+              <a:latin typeface="Linux Libertine" panose="02000503000000000000" pitchFamily="2" charset="0"/>
+              <a:ea typeface="Linux Libertine" panose="02000503000000000000" pitchFamily="2" charset="0"/>
+              <a:cs typeface="Linux Libertine" panose="02000503000000000000" pitchFamily="2" charset="0"/>
             </a:endParaRPr>
           </a:p>
         </p:txBody>
@@ -4262,6 +4286,9 @@
               <a:solidFill>
                 <a:schemeClr val="tx1"/>
               </a:solidFill>
+              <a:latin typeface="Linux Libertine" panose="02000503000000000000" pitchFamily="2" charset="0"/>
+              <a:ea typeface="Linux Libertine" panose="02000503000000000000" pitchFamily="2" charset="0"/>
+              <a:cs typeface="Linux Libertine" panose="02000503000000000000" pitchFamily="2" charset="0"/>
             </a:endParaRPr>
           </a:p>
         </p:txBody>
@@ -4274,8 +4301,8 @@
         </p:nvSpPr>
         <p:spPr>
           <a:xfrm>
-            <a:off x="1754098" y="3292607"/>
-            <a:ext cx="7969022" cy="369332"/>
+            <a:off x="2098824" y="3292607"/>
+            <a:ext cx="7624296" cy="307777"/>
           </a:xfrm>
           <a:prstGeom prst="rect">
             <a:avLst/>
@@ -4289,46 +4316,138 @@
           <a:lstStyle/>
           <a:p>
             <a:r>
-              <a:rPr lang="de-DE" dirty="0" err="1" smtClean="0"/>
+              <a:rPr lang="de-DE" sz="1400" dirty="0" err="1" smtClean="0">
+                <a:latin typeface="Linux Libertine" panose="02000503000000000000" pitchFamily="2" charset="0"/>
+                <a:ea typeface="Linux Libertine" panose="02000503000000000000" pitchFamily="2" charset="0"/>
+                <a:cs typeface="Linux Libertine" panose="02000503000000000000" pitchFamily="2" charset="0"/>
+              </a:rPr>
               <a:t>Step</a:t>
             </a:r>
             <a:r>
-              <a:rPr lang="de-DE" dirty="0" smtClean="0"/>
-              <a:t>:                     1             </a:t>
-            </a:r>
-            <a:r>
-              <a:rPr lang="de-DE" dirty="0" smtClean="0"/>
-              <a:t>*                 </a:t>
-            </a:r>
-            <a:r>
-              <a:rPr lang="de-DE" dirty="0" smtClean="0"/>
-              <a:t>             </a:t>
-            </a:r>
-            <a:r>
-              <a:rPr lang="de-DE" dirty="0"/>
+              <a:rPr lang="de-DE" sz="1400" dirty="0" smtClean="0">
+                <a:latin typeface="Linux Libertine" panose="02000503000000000000" pitchFamily="2" charset="0"/>
+                <a:ea typeface="Linux Libertine" panose="02000503000000000000" pitchFamily="2" charset="0"/>
+                <a:cs typeface="Linux Libertine" panose="02000503000000000000" pitchFamily="2" charset="0"/>
+              </a:rPr>
+              <a:t>:                  </a:t>
+            </a:r>
+            <a:r>
+              <a:rPr lang="de-DE" sz="1400" dirty="0" smtClean="0">
+                <a:latin typeface="Linux Libertine" panose="02000503000000000000" pitchFamily="2" charset="0"/>
+                <a:ea typeface="Linux Libertine" panose="02000503000000000000" pitchFamily="2" charset="0"/>
+                <a:cs typeface="Linux Libertine" panose="02000503000000000000" pitchFamily="2" charset="0"/>
+              </a:rPr>
+              <a:t>   </a:t>
+            </a:r>
+            <a:r>
+              <a:rPr lang="de-DE" sz="1400" dirty="0" smtClean="0">
+                <a:latin typeface="Linux Libertine" panose="02000503000000000000" pitchFamily="2" charset="0"/>
+                <a:ea typeface="Linux Libertine" panose="02000503000000000000" pitchFamily="2" charset="0"/>
+                <a:cs typeface="Linux Libertine" panose="02000503000000000000" pitchFamily="2" charset="0"/>
+              </a:rPr>
+              <a:t>1    </a:t>
+            </a:r>
+            <a:r>
+              <a:rPr lang="de-DE" sz="1400" dirty="0" smtClean="0">
+                <a:latin typeface="Linux Libertine" panose="02000503000000000000" pitchFamily="2" charset="0"/>
+                <a:ea typeface="Linux Libertine" panose="02000503000000000000" pitchFamily="2" charset="0"/>
+                <a:cs typeface="Linux Libertine" panose="02000503000000000000" pitchFamily="2" charset="0"/>
+              </a:rPr>
+              <a:t>           </a:t>
+            </a:r>
+            <a:r>
+              <a:rPr lang="de-DE" sz="1400" dirty="0" smtClean="0">
+                <a:latin typeface="Linux Libertine" panose="02000503000000000000" pitchFamily="2" charset="0"/>
+                <a:ea typeface="Linux Libertine" panose="02000503000000000000" pitchFamily="2" charset="0"/>
+                <a:cs typeface="Linux Libertine" panose="02000503000000000000" pitchFamily="2" charset="0"/>
+              </a:rPr>
+              <a:t>*                        </a:t>
+            </a:r>
+            <a:r>
+              <a:rPr lang="de-DE" sz="1400" dirty="0" smtClean="0">
+                <a:latin typeface="Linux Libertine" panose="02000503000000000000" pitchFamily="2" charset="0"/>
+                <a:ea typeface="Linux Libertine" panose="02000503000000000000" pitchFamily="2" charset="0"/>
+                <a:cs typeface="Linux Libertine" panose="02000503000000000000" pitchFamily="2" charset="0"/>
+              </a:rPr>
+              <a:t>           </a:t>
+            </a:r>
+            <a:r>
+              <a:rPr lang="de-DE" sz="1400" dirty="0">
+                <a:latin typeface="Linux Libertine" panose="02000503000000000000" pitchFamily="2" charset="0"/>
+                <a:ea typeface="Linux Libertine" panose="02000503000000000000" pitchFamily="2" charset="0"/>
+                <a:cs typeface="Linux Libertine" panose="02000503000000000000" pitchFamily="2" charset="0"/>
+              </a:rPr>
               <a:t>2</a:t>
             </a:r>
             <a:r>
-              <a:rPr lang="de-DE" dirty="0" smtClean="0"/>
-              <a:t>                                  </a:t>
-            </a:r>
-            <a:r>
-              <a:rPr lang="de-DE" dirty="0"/>
+              <a:rPr lang="de-DE" sz="1400" dirty="0" smtClean="0">
+                <a:latin typeface="Linux Libertine" panose="02000503000000000000" pitchFamily="2" charset="0"/>
+                <a:ea typeface="Linux Libertine" panose="02000503000000000000" pitchFamily="2" charset="0"/>
+                <a:cs typeface="Linux Libertine" panose="02000503000000000000" pitchFamily="2" charset="0"/>
+              </a:rPr>
+              <a:t>                             </a:t>
+            </a:r>
+            <a:r>
+              <a:rPr lang="de-DE" sz="1400" dirty="0" smtClean="0">
+                <a:latin typeface="Linux Libertine" panose="02000503000000000000" pitchFamily="2" charset="0"/>
+                <a:ea typeface="Linux Libertine" panose="02000503000000000000" pitchFamily="2" charset="0"/>
+                <a:cs typeface="Linux Libertine" panose="02000503000000000000" pitchFamily="2" charset="0"/>
+              </a:rPr>
+              <a:t>              </a:t>
+            </a:r>
+            <a:r>
+              <a:rPr lang="de-DE" sz="1400" dirty="0">
+                <a:latin typeface="Linux Libertine" panose="02000503000000000000" pitchFamily="2" charset="0"/>
+                <a:ea typeface="Linux Libertine" panose="02000503000000000000" pitchFamily="2" charset="0"/>
+                <a:cs typeface="Linux Libertine" panose="02000503000000000000" pitchFamily="2" charset="0"/>
+              </a:rPr>
               <a:t>*</a:t>
             </a:r>
             <a:r>
-              <a:rPr lang="de-DE" dirty="0" smtClean="0"/>
-              <a:t>            *          </a:t>
-            </a:r>
-            <a:r>
-              <a:rPr lang="de-DE" dirty="0" smtClean="0"/>
+              <a:rPr lang="de-DE" sz="1400" dirty="0" smtClean="0">
+                <a:latin typeface="Linux Libertine" panose="02000503000000000000" pitchFamily="2" charset="0"/>
+                <a:ea typeface="Linux Libertine" panose="02000503000000000000" pitchFamily="2" charset="0"/>
+                <a:cs typeface="Linux Libertine" panose="02000503000000000000" pitchFamily="2" charset="0"/>
+              </a:rPr>
+              <a:t>         </a:t>
+            </a:r>
+            <a:r>
+              <a:rPr lang="de-DE" sz="1400" dirty="0" smtClean="0">
+                <a:latin typeface="Linux Libertine" panose="02000503000000000000" pitchFamily="2" charset="0"/>
+                <a:ea typeface="Linux Libertine" panose="02000503000000000000" pitchFamily="2" charset="0"/>
+                <a:cs typeface="Linux Libertine" panose="02000503000000000000" pitchFamily="2" charset="0"/>
+              </a:rPr>
+              <a:t>       </a:t>
+            </a:r>
+            <a:r>
+              <a:rPr lang="de-DE" sz="1400" dirty="0" smtClean="0">
+                <a:latin typeface="Linux Libertine" panose="02000503000000000000" pitchFamily="2" charset="0"/>
+                <a:ea typeface="Linux Libertine" panose="02000503000000000000" pitchFamily="2" charset="0"/>
+                <a:cs typeface="Linux Libertine" panose="02000503000000000000" pitchFamily="2" charset="0"/>
+              </a:rPr>
+              <a:t>*           </a:t>
+            </a:r>
+            <a:r>
+              <a:rPr lang="de-DE" sz="1400" dirty="0" smtClean="0">
+                <a:latin typeface="Linux Libertine" panose="02000503000000000000" pitchFamily="2" charset="0"/>
+                <a:ea typeface="Linux Libertine" panose="02000503000000000000" pitchFamily="2" charset="0"/>
+                <a:cs typeface="Linux Libertine" panose="02000503000000000000" pitchFamily="2" charset="0"/>
+              </a:rPr>
               <a:t>    </a:t>
             </a:r>
             <a:r>
-              <a:rPr lang="de-DE" dirty="0" smtClean="0"/>
+              <a:rPr lang="de-DE" sz="1400" dirty="0" smtClean="0">
+                <a:latin typeface="Linux Libertine" panose="02000503000000000000" pitchFamily="2" charset="0"/>
+                <a:ea typeface="Linux Libertine" panose="02000503000000000000" pitchFamily="2" charset="0"/>
+                <a:cs typeface="Linux Libertine" panose="02000503000000000000" pitchFamily="2" charset="0"/>
+              </a:rPr>
               <a:t>3</a:t>
             </a:r>
-            <a:endParaRPr lang="en-US" dirty="0"/>
+            <a:endParaRPr lang="en-US" sz="1400" dirty="0">
+              <a:latin typeface="Linux Libertine" panose="02000503000000000000" pitchFamily="2" charset="0"/>
+              <a:ea typeface="Linux Libertine" panose="02000503000000000000" pitchFamily="2" charset="0"/>
+              <a:cs typeface="Linux Libertine" panose="02000503000000000000" pitchFamily="2" charset="0"/>
+            </a:endParaRPr>
           </a:p>
         </p:txBody>
       </p:sp>
@@ -4378,6 +4497,9 @@
               <a:solidFill>
                 <a:schemeClr val="tx1"/>
               </a:solidFill>
+              <a:latin typeface="Linux Libertine" panose="02000503000000000000" pitchFamily="2" charset="0"/>
+              <a:ea typeface="Linux Libertine" panose="02000503000000000000" pitchFamily="2" charset="0"/>
+              <a:cs typeface="Linux Libertine" panose="02000503000000000000" pitchFamily="2" charset="0"/>
             </a:endParaRPr>
           </a:p>
         </p:txBody>
@@ -4428,6 +4550,9 @@
               <a:solidFill>
                 <a:schemeClr val="tx1"/>
               </a:solidFill>
+              <a:latin typeface="Linux Libertine" panose="02000503000000000000" pitchFamily="2" charset="0"/>
+              <a:ea typeface="Linux Libertine" panose="02000503000000000000" pitchFamily="2" charset="0"/>
+              <a:cs typeface="Linux Libertine" panose="02000503000000000000" pitchFamily="2" charset="0"/>
             </a:endParaRPr>
           </a:p>
         </p:txBody>
@@ -4784,6 +4909,9 @@
               <a:solidFill>
                 <a:schemeClr val="tx1"/>
               </a:solidFill>
+              <a:latin typeface="Linux Libertine" panose="02000503000000000000" pitchFamily="2" charset="0"/>
+              <a:ea typeface="Linux Libertine" panose="02000503000000000000" pitchFamily="2" charset="0"/>
+              <a:cs typeface="Linux Libertine" panose="02000503000000000000" pitchFamily="2" charset="0"/>
             </a:endParaRPr>
           </a:p>
         </p:txBody>
@@ -5185,6 +5313,9 @@
               <a:solidFill>
                 <a:schemeClr val="tx1"/>
               </a:solidFill>
+              <a:latin typeface="Linux Libertine" panose="02000503000000000000" pitchFamily="2" charset="0"/>
+              <a:ea typeface="Linux Libertine" panose="02000503000000000000" pitchFamily="2" charset="0"/>
+              <a:cs typeface="Linux Libertine" panose="02000503000000000000" pitchFamily="2" charset="0"/>
             </a:endParaRPr>
           </a:p>
         </p:txBody>
@@ -5253,6 +5384,9 @@
                 <a:solidFill>
                   <a:schemeClr val="tx1"/>
                 </a:solidFill>
+                <a:latin typeface="Linux Libertine" panose="02000503000000000000" pitchFamily="2" charset="0"/>
+                <a:ea typeface="Linux Libertine" panose="02000503000000000000" pitchFamily="2" charset="0"/>
+                <a:cs typeface="Linux Libertine" panose="02000503000000000000" pitchFamily="2" charset="0"/>
               </a:endParaRPr>
             </a:p>
           </p:txBody>
@@ -5298,33 +5432,67 @@
             <a:p>
               <a:pPr algn="ctr"/>
               <a:r>
-                <a:rPr lang="de-DE" sz="900" smtClean="0">
+                <a:rPr lang="de-DE" sz="900" dirty="0" smtClean="0">
                   <a:solidFill>
                     <a:schemeClr val="tx1"/>
                   </a:solidFill>
+                  <a:latin typeface="Linux Libertine" panose="02000503000000000000" pitchFamily="2" charset="0"/>
+                  <a:ea typeface="Linux Libertine" panose="02000503000000000000" pitchFamily="2" charset="0"/>
+                  <a:cs typeface="Linux Libertine" panose="02000503000000000000" pitchFamily="2" charset="0"/>
                 </a:rPr>
-                <a:t>&lt;Configurable</a:t>
+                <a:t>&lt;</a:t>
               </a:r>
-              <a:endParaRPr lang="de-DE" sz="900">
+              <a:r>
+                <a:rPr lang="de-DE" sz="900" dirty="0" err="1" smtClean="0">
+                  <a:solidFill>
+                    <a:schemeClr val="tx1"/>
+                  </a:solidFill>
+                  <a:latin typeface="Linux Libertine" panose="02000503000000000000" pitchFamily="2" charset="0"/>
+                  <a:ea typeface="Linux Libertine" panose="02000503000000000000" pitchFamily="2" charset="0"/>
+                  <a:cs typeface="Linux Libertine" panose="02000503000000000000" pitchFamily="2" charset="0"/>
+                </a:rPr>
+                <a:t>Configurable</a:t>
+              </a:r>
+              <a:endParaRPr lang="de-DE" sz="900" dirty="0">
                 <a:solidFill>
                   <a:schemeClr val="tx1"/>
                 </a:solidFill>
+                <a:latin typeface="Linux Libertine" panose="02000503000000000000" pitchFamily="2" charset="0"/>
+                <a:ea typeface="Linux Libertine" panose="02000503000000000000" pitchFamily="2" charset="0"/>
+                <a:cs typeface="Linux Libertine" panose="02000503000000000000" pitchFamily="2" charset="0"/>
               </a:endParaRPr>
             </a:p>
             <a:p>
               <a:pPr algn="ctr"/>
               <a:r>
-                <a:rPr lang="de-DE" sz="900" smtClean="0">
+                <a:rPr lang="de-DE" sz="900" dirty="0" err="1" smtClean="0">
                   <a:solidFill>
                     <a:schemeClr val="tx1"/>
                   </a:solidFill>
+                  <a:latin typeface="Linux Libertine" panose="02000503000000000000" pitchFamily="2" charset="0"/>
+                  <a:ea typeface="Linux Libertine" panose="02000503000000000000" pitchFamily="2" charset="0"/>
+                  <a:cs typeface="Linux Libertine" panose="02000503000000000000" pitchFamily="2" charset="0"/>
                 </a:rPr>
-                <a:t>Sources&gt;</a:t>
+                <a:t>Sources</a:t>
               </a:r>
-              <a:endParaRPr lang="en-US" sz="900">
+              <a:r>
+                <a:rPr lang="de-DE" sz="900" dirty="0" smtClean="0">
+                  <a:solidFill>
+                    <a:schemeClr val="tx1"/>
+                  </a:solidFill>
+                  <a:latin typeface="Linux Libertine" panose="02000503000000000000" pitchFamily="2" charset="0"/>
+                  <a:ea typeface="Linux Libertine" panose="02000503000000000000" pitchFamily="2" charset="0"/>
+                  <a:cs typeface="Linux Libertine" panose="02000503000000000000" pitchFamily="2" charset="0"/>
+                </a:rPr>
+                <a:t>&gt;</a:t>
+              </a:r>
+              <a:endParaRPr lang="en-US" sz="900" dirty="0">
                 <a:solidFill>
                   <a:schemeClr val="tx1"/>
                 </a:solidFill>
+                <a:latin typeface="Linux Libertine" panose="02000503000000000000" pitchFamily="2" charset="0"/>
+                <a:ea typeface="Linux Libertine" panose="02000503000000000000" pitchFamily="2" charset="0"/>
+                <a:cs typeface="Linux Libertine" panose="02000503000000000000" pitchFamily="2" charset="0"/>
               </a:endParaRPr>
             </a:p>
           </p:txBody>
@@ -5408,6 +5576,9 @@
                   <a:solidFill>
                     <a:schemeClr val="tx1"/>
                   </a:solidFill>
+                  <a:latin typeface="Linux Libertine" panose="02000503000000000000" pitchFamily="2" charset="0"/>
+                  <a:ea typeface="Linux Libertine" panose="02000503000000000000" pitchFamily="2" charset="0"/>
+                  <a:cs typeface="Linux Libertine" panose="02000503000000000000" pitchFamily="2" charset="0"/>
                 </a:endParaRPr>
               </a:p>
             </p:txBody>
@@ -5463,6 +5634,9 @@
                   <a:solidFill>
                     <a:schemeClr val="tx1"/>
                   </a:solidFill>
+                  <a:latin typeface="Linux Libertine" panose="02000503000000000000" pitchFamily="2" charset="0"/>
+                  <a:ea typeface="Linux Libertine" panose="02000503000000000000" pitchFamily="2" charset="0"/>
+                  <a:cs typeface="Linux Libertine" panose="02000503000000000000" pitchFamily="2" charset="0"/>
                 </a:endParaRPr>
               </a:p>
             </p:txBody>
@@ -5515,6 +5689,9 @@
                   <a:solidFill>
                     <a:schemeClr val="tx1"/>
                   </a:solidFill>
+                  <a:latin typeface="Linux Libertine" panose="02000503000000000000" pitchFamily="2" charset="0"/>
+                  <a:ea typeface="Linux Libertine" panose="02000503000000000000" pitchFamily="2" charset="0"/>
+                  <a:cs typeface="Linux Libertine" panose="02000503000000000000" pitchFamily="2" charset="0"/>
                 </a:endParaRPr>
               </a:p>
             </p:txBody>
@@ -5561,28 +5738,56 @@
             <a:p>
               <a:pPr algn="ctr"/>
               <a:r>
-                <a:rPr lang="de-DE" sz="900">
+                <a:rPr lang="de-DE" sz="900" dirty="0">
                   <a:solidFill>
                     <a:schemeClr val="tx1"/>
                   </a:solidFill>
+                  <a:latin typeface="Linux Libertine" panose="02000503000000000000" pitchFamily="2" charset="0"/>
+                  <a:ea typeface="Linux Libertine" panose="02000503000000000000" pitchFamily="2" charset="0"/>
+                  <a:cs typeface="Linux Libertine" panose="02000503000000000000" pitchFamily="2" charset="0"/>
                 </a:rPr>
-                <a:t>&lt;Configuration</a:t>
+                <a:t>&lt;</a:t>
               </a:r>
+              <a:r>
+                <a:rPr lang="de-DE" sz="900" dirty="0" err="1">
+                  <a:solidFill>
+                    <a:schemeClr val="tx1"/>
+                  </a:solidFill>
+                  <a:latin typeface="Linux Libertine" panose="02000503000000000000" pitchFamily="2" charset="0"/>
+                  <a:ea typeface="Linux Libertine" panose="02000503000000000000" pitchFamily="2" charset="0"/>
+                  <a:cs typeface="Linux Libertine" panose="02000503000000000000" pitchFamily="2" charset="0"/>
+                </a:rPr>
+                <a:t>Configuration</a:t>
+              </a:r>
+              <a:endParaRPr lang="de-DE" sz="900" dirty="0">
+                <a:solidFill>
+                  <a:schemeClr val="tx1"/>
+                </a:solidFill>
+                <a:latin typeface="Linux Libertine" panose="02000503000000000000" pitchFamily="2" charset="0"/>
+                <a:ea typeface="Linux Libertine" panose="02000503000000000000" pitchFamily="2" charset="0"/>
+                <a:cs typeface="Linux Libertine" panose="02000503000000000000" pitchFamily="2" charset="0"/>
+              </a:endParaRPr>
             </a:p>
             <a:p>
               <a:pPr algn="ctr"/>
               <a:r>
-                <a:rPr lang="de-DE" sz="900">
+                <a:rPr lang="de-DE" sz="900" dirty="0">
                   <a:solidFill>
                     <a:schemeClr val="tx1"/>
                   </a:solidFill>
+                  <a:latin typeface="Linux Libertine" panose="02000503000000000000" pitchFamily="2" charset="0"/>
+                  <a:ea typeface="Linux Libertine" panose="02000503000000000000" pitchFamily="2" charset="0"/>
+                  <a:cs typeface="Linux Libertine" panose="02000503000000000000" pitchFamily="2" charset="0"/>
                 </a:rPr>
                 <a:t>Data&gt;</a:t>
               </a:r>
-              <a:endParaRPr lang="en-US" sz="900">
+              <a:endParaRPr lang="en-US" sz="900" dirty="0">
                 <a:solidFill>
                   <a:schemeClr val="tx1"/>
                 </a:solidFill>
+                <a:latin typeface="Linux Libertine" panose="02000503000000000000" pitchFamily="2" charset="0"/>
+                <a:ea typeface="Linux Libertine" panose="02000503000000000000" pitchFamily="2" charset="0"/>
+                <a:cs typeface="Linux Libertine" panose="02000503000000000000" pitchFamily="2" charset="0"/>
               </a:endParaRPr>
             </a:p>
           </p:txBody>
@@ -5652,6 +5857,9 @@
                 <a:solidFill>
                   <a:schemeClr val="tx1"/>
                 </a:solidFill>
+                <a:latin typeface="Linux Libertine" panose="02000503000000000000" pitchFamily="2" charset="0"/>
+                <a:ea typeface="Linux Libertine" panose="02000503000000000000" pitchFamily="2" charset="0"/>
+                <a:cs typeface="Linux Libertine" panose="02000503000000000000" pitchFamily="2" charset="0"/>
               </a:endParaRPr>
             </a:p>
           </p:txBody>
@@ -5697,10 +5905,13 @@
             <a:p>
               <a:pPr algn="ctr" defTabSz="914400"/>
               <a:r>
-                <a:rPr lang="de-DE" sz="900" smtClean="0">
+                <a:rPr lang="de-DE" sz="900" dirty="0" smtClean="0">
                   <a:solidFill>
                     <a:schemeClr val="tx1"/>
                   </a:solidFill>
+                  <a:latin typeface="Linux Libertine" panose="02000503000000000000" pitchFamily="2" charset="0"/>
+                  <a:ea typeface="Linux Libertine" panose="02000503000000000000" pitchFamily="2" charset="0"/>
+                  <a:cs typeface="Linux Libertine" panose="02000503000000000000" pitchFamily="2" charset="0"/>
                 </a:rPr>
                 <a:t>&lt;Legacy</a:t>
               </a:r>
@@ -5708,17 +5919,34 @@
             <a:p>
               <a:pPr algn="ctr" defTabSz="914400"/>
               <a:r>
-                <a:rPr lang="de-DE" sz="900" smtClean="0">
+                <a:rPr lang="de-DE" sz="900" dirty="0" err="1" smtClean="0">
                   <a:solidFill>
                     <a:schemeClr val="tx1"/>
                   </a:solidFill>
+                  <a:latin typeface="Linux Libertine" panose="02000503000000000000" pitchFamily="2" charset="0"/>
+                  <a:ea typeface="Linux Libertine" panose="02000503000000000000" pitchFamily="2" charset="0"/>
+                  <a:cs typeface="Linux Libertine" panose="02000503000000000000" pitchFamily="2" charset="0"/>
                 </a:rPr>
-                <a:t>Sources&gt;</a:t>
+                <a:t>Sources</a:t>
               </a:r>
-              <a:endParaRPr lang="en-US" sz="900">
+              <a:r>
+                <a:rPr lang="de-DE" sz="900" dirty="0" smtClean="0">
+                  <a:solidFill>
+                    <a:schemeClr val="tx1"/>
+                  </a:solidFill>
+                  <a:latin typeface="Linux Libertine" panose="02000503000000000000" pitchFamily="2" charset="0"/>
+                  <a:ea typeface="Linux Libertine" panose="02000503000000000000" pitchFamily="2" charset="0"/>
+                  <a:cs typeface="Linux Libertine" panose="02000503000000000000" pitchFamily="2" charset="0"/>
+                </a:rPr>
+                <a:t>&gt;</a:t>
+              </a:r>
+              <a:endParaRPr lang="en-US" sz="900" dirty="0">
                 <a:solidFill>
                   <a:schemeClr val="tx1"/>
                 </a:solidFill>
+                <a:latin typeface="Linux Libertine" panose="02000503000000000000" pitchFamily="2" charset="0"/>
+                <a:ea typeface="Linux Libertine" panose="02000503000000000000" pitchFamily="2" charset="0"/>
+                <a:cs typeface="Linux Libertine" panose="02000503000000000000" pitchFamily="2" charset="0"/>
               </a:endParaRPr>
             </a:p>
           </p:txBody>
@@ -5771,6 +5999,9 @@
               <a:solidFill>
                 <a:schemeClr val="tx1"/>
               </a:solidFill>
+              <a:latin typeface="Linux Libertine" panose="02000503000000000000" pitchFamily="2" charset="0"/>
+              <a:ea typeface="Linux Libertine" panose="02000503000000000000" pitchFamily="2" charset="0"/>
+              <a:cs typeface="Linux Libertine" panose="02000503000000000000" pitchFamily="2" charset="0"/>
             </a:endParaRPr>
           </a:p>
         </p:txBody>
@@ -5822,6 +6053,9 @@
               <a:solidFill>
                 <a:schemeClr val="tx1"/>
               </a:solidFill>
+              <a:latin typeface="Linux Libertine" panose="02000503000000000000" pitchFamily="2" charset="0"/>
+              <a:ea typeface="Linux Libertine" panose="02000503000000000000" pitchFamily="2" charset="0"/>
+              <a:cs typeface="Linux Libertine" panose="02000503000000000000" pitchFamily="2" charset="0"/>
             </a:endParaRPr>
           </a:p>
         </p:txBody>
@@ -5872,6 +6106,9 @@
               <a:solidFill>
                 <a:schemeClr val="tx1"/>
               </a:solidFill>
+              <a:latin typeface="Linux Libertine" panose="02000503000000000000" pitchFamily="2" charset="0"/>
+              <a:ea typeface="Linux Libertine" panose="02000503000000000000" pitchFamily="2" charset="0"/>
+              <a:cs typeface="Linux Libertine" panose="02000503000000000000" pitchFamily="2" charset="0"/>
             </a:endParaRPr>
           </a:p>
         </p:txBody>
@@ -5922,6 +6159,9 @@
               <a:solidFill>
                 <a:schemeClr val="tx1"/>
               </a:solidFill>
+              <a:latin typeface="Linux Libertine" panose="02000503000000000000" pitchFamily="2" charset="0"/>
+              <a:ea typeface="Linux Libertine" panose="02000503000000000000" pitchFamily="2" charset="0"/>
+              <a:cs typeface="Linux Libertine" panose="02000503000000000000" pitchFamily="2" charset="0"/>
             </a:endParaRPr>
           </a:p>
         </p:txBody>
@@ -5972,6 +6212,9 @@
               <a:solidFill>
                 <a:schemeClr val="tx1"/>
               </a:solidFill>
+              <a:latin typeface="Linux Libertine" panose="02000503000000000000" pitchFamily="2" charset="0"/>
+              <a:ea typeface="Linux Libertine" panose="02000503000000000000" pitchFamily="2" charset="0"/>
+              <a:cs typeface="Linux Libertine" panose="02000503000000000000" pitchFamily="2" charset="0"/>
             </a:endParaRPr>
           </a:p>
         </p:txBody>
@@ -6022,6 +6265,9 @@
               <a:solidFill>
                 <a:schemeClr val="tx1"/>
               </a:solidFill>
+              <a:latin typeface="Linux Libertine" panose="02000503000000000000" pitchFamily="2" charset="0"/>
+              <a:ea typeface="Linux Libertine" panose="02000503000000000000" pitchFamily="2" charset="0"/>
+              <a:cs typeface="Linux Libertine" panose="02000503000000000000" pitchFamily="2" charset="0"/>
             </a:endParaRPr>
           </a:p>
         </p:txBody>
@@ -6072,6 +6318,9 @@
               <a:solidFill>
                 <a:schemeClr val="tx1"/>
               </a:solidFill>
+              <a:latin typeface="Linux Libertine" panose="02000503000000000000" pitchFamily="2" charset="0"/>
+              <a:ea typeface="Linux Libertine" panose="02000503000000000000" pitchFamily="2" charset="0"/>
+              <a:cs typeface="Linux Libertine" panose="02000503000000000000" pitchFamily="2" charset="0"/>
             </a:endParaRPr>
           </a:p>
         </p:txBody>
@@ -6122,6 +6371,9 @@
               <a:solidFill>
                 <a:schemeClr val="tx1"/>
               </a:solidFill>
+              <a:latin typeface="Linux Libertine" panose="02000503000000000000" pitchFamily="2" charset="0"/>
+              <a:ea typeface="Linux Libertine" panose="02000503000000000000" pitchFamily="2" charset="0"/>
+              <a:cs typeface="Linux Libertine" panose="02000503000000000000" pitchFamily="2" charset="0"/>
             </a:endParaRPr>
           </a:p>
         </p:txBody>
@@ -6172,6 +6424,9 @@
               <a:solidFill>
                 <a:schemeClr val="tx1"/>
               </a:solidFill>
+              <a:latin typeface="Linux Libertine" panose="02000503000000000000" pitchFamily="2" charset="0"/>
+              <a:ea typeface="Linux Libertine" panose="02000503000000000000" pitchFamily="2" charset="0"/>
+              <a:cs typeface="Linux Libertine" panose="02000503000000000000" pitchFamily="2" charset="0"/>
             </a:endParaRPr>
           </a:p>
         </p:txBody>
@@ -6329,6 +6584,9 @@
                 <a:solidFill>
                   <a:schemeClr val="tx1"/>
                 </a:solidFill>
+                <a:latin typeface="Linux Libertine" panose="02000503000000000000" pitchFamily="2" charset="0"/>
+                <a:ea typeface="Linux Libertine" panose="02000503000000000000" pitchFamily="2" charset="0"/>
+                <a:cs typeface="Linux Libertine" panose="02000503000000000000" pitchFamily="2" charset="0"/>
               </a:endParaRPr>
             </a:p>
           </p:txBody>
@@ -6374,28 +6632,56 @@
             <a:p>
               <a:pPr algn="ctr"/>
               <a:r>
-                <a:rPr lang="de-DE" sz="900" smtClean="0">
+                <a:rPr lang="de-DE" sz="900" dirty="0" smtClean="0">
                   <a:solidFill>
                     <a:schemeClr val="tx1"/>
                   </a:solidFill>
+                  <a:latin typeface="Linux Libertine" panose="02000503000000000000" pitchFamily="2" charset="0"/>
+                  <a:ea typeface="Linux Libertine" panose="02000503000000000000" pitchFamily="2" charset="0"/>
+                  <a:cs typeface="Linux Libertine" panose="02000503000000000000" pitchFamily="2" charset="0"/>
                 </a:rPr>
-                <a:t>&lt;Build</a:t>
+                <a:t>&lt;</a:t>
               </a:r>
+              <a:r>
+                <a:rPr lang="de-DE" sz="900" dirty="0" err="1" smtClean="0">
+                  <a:solidFill>
+                    <a:schemeClr val="tx1"/>
+                  </a:solidFill>
+                  <a:latin typeface="Linux Libertine" panose="02000503000000000000" pitchFamily="2" charset="0"/>
+                  <a:ea typeface="Linux Libertine" panose="02000503000000000000" pitchFamily="2" charset="0"/>
+                  <a:cs typeface="Linux Libertine" panose="02000503000000000000" pitchFamily="2" charset="0"/>
+                </a:rPr>
+                <a:t>Build</a:t>
+              </a:r>
+              <a:endParaRPr lang="de-DE" sz="900" dirty="0" smtClean="0">
+                <a:solidFill>
+                  <a:schemeClr val="tx1"/>
+                </a:solidFill>
+                <a:latin typeface="Linux Libertine" panose="02000503000000000000" pitchFamily="2" charset="0"/>
+                <a:ea typeface="Linux Libertine" panose="02000503000000000000" pitchFamily="2" charset="0"/>
+                <a:cs typeface="Linux Libertine" panose="02000503000000000000" pitchFamily="2" charset="0"/>
+              </a:endParaRPr>
             </a:p>
             <a:p>
               <a:pPr algn="ctr"/>
               <a:r>
-                <a:rPr lang="de-DE" sz="900" smtClean="0">
+                <a:rPr lang="de-DE" sz="900" dirty="0" smtClean="0">
                   <a:solidFill>
                     <a:schemeClr val="tx1"/>
                   </a:solidFill>
+                  <a:latin typeface="Linux Libertine" panose="02000503000000000000" pitchFamily="2" charset="0"/>
+                  <a:ea typeface="Linux Libertine" panose="02000503000000000000" pitchFamily="2" charset="0"/>
+                  <a:cs typeface="Linux Libertine" panose="02000503000000000000" pitchFamily="2" charset="0"/>
                 </a:rPr>
                 <a:t>System&gt;</a:t>
               </a:r>
-              <a:endParaRPr lang="en-US" sz="900">
+              <a:endParaRPr lang="en-US" sz="900" dirty="0">
                 <a:solidFill>
                   <a:schemeClr val="tx1"/>
                 </a:solidFill>
+                <a:latin typeface="Linux Libertine" panose="02000503000000000000" pitchFamily="2" charset="0"/>
+                <a:ea typeface="Linux Libertine" panose="02000503000000000000" pitchFamily="2" charset="0"/>
+                <a:cs typeface="Linux Libertine" panose="02000503000000000000" pitchFamily="2" charset="0"/>
               </a:endParaRPr>
             </a:p>
           </p:txBody>
@@ -6511,6 +6797,9 @@
               <a:solidFill>
                 <a:schemeClr val="tx1"/>
               </a:solidFill>
+              <a:latin typeface="Linux Libertine" panose="02000503000000000000" pitchFamily="2" charset="0"/>
+              <a:ea typeface="Linux Libertine" panose="02000503000000000000" pitchFamily="2" charset="0"/>
+              <a:cs typeface="Linux Libertine" panose="02000503000000000000" pitchFamily="2" charset="0"/>
             </a:endParaRPr>
           </a:p>
         </p:txBody>
@@ -6523,8 +6812,8 @@
         </p:nvSpPr>
         <p:spPr>
           <a:xfrm rot="16200000">
-            <a:off x="8997595" y="1128840"/>
-            <a:ext cx="2117504" cy="338554"/>
+            <a:off x="8905232" y="1144228"/>
+            <a:ext cx="2302233" cy="307777"/>
           </a:xfrm>
           <a:prstGeom prst="rect">
             <a:avLst/>
@@ -6538,42 +6827,74 @@
           <a:p>
             <a:pPr algn="r"/>
             <a:r>
-              <a:rPr lang="de-DE" sz="1100" dirty="0" err="1"/>
+              <a:rPr lang="de-DE" sz="1100" dirty="0" err="1">
+                <a:latin typeface="Linux Libertine" panose="02000503000000000000" pitchFamily="2" charset="0"/>
+                <a:ea typeface="Linux Libertine" panose="02000503000000000000" pitchFamily="2" charset="0"/>
+                <a:cs typeface="Linux Libertine" panose="02000503000000000000" pitchFamily="2" charset="0"/>
+              </a:rPr>
               <a:t>Number</a:t>
             </a:r>
             <a:r>
-              <a:rPr lang="de-DE" sz="1100" dirty="0"/>
+              <a:rPr lang="de-DE" sz="1100" dirty="0">
+                <a:latin typeface="Linux Libertine" panose="02000503000000000000" pitchFamily="2" charset="0"/>
+                <a:ea typeface="Linux Libertine" panose="02000503000000000000" pitchFamily="2" charset="0"/>
+                <a:cs typeface="Linux Libertine" panose="02000503000000000000" pitchFamily="2" charset="0"/>
+              </a:rPr>
               <a:t> </a:t>
             </a:r>
             <a:r>
-              <a:rPr lang="de-DE" sz="1100" dirty="0" err="1"/>
+              <a:rPr lang="de-DE" sz="1100" dirty="0" err="1">
+                <a:latin typeface="Linux Libertine" panose="02000503000000000000" pitchFamily="2" charset="0"/>
+                <a:ea typeface="Linux Libertine" panose="02000503000000000000" pitchFamily="2" charset="0"/>
+                <a:cs typeface="Linux Libertine" panose="02000503000000000000" pitchFamily="2" charset="0"/>
+              </a:rPr>
               <a:t>of</a:t>
             </a:r>
             <a:r>
-              <a:rPr lang="de-DE" sz="1100" dirty="0"/>
+              <a:rPr lang="de-DE" sz="1100" dirty="0">
+                <a:latin typeface="Linux Libertine" panose="02000503000000000000" pitchFamily="2" charset="0"/>
+                <a:ea typeface="Linux Libertine" panose="02000503000000000000" pitchFamily="2" charset="0"/>
+                <a:cs typeface="Linux Libertine" panose="02000503000000000000" pitchFamily="2" charset="0"/>
+              </a:rPr>
               <a:t> Lines </a:t>
             </a:r>
             <a:r>
-              <a:rPr lang="de-DE" sz="1100" dirty="0" err="1"/>
+              <a:rPr lang="de-DE" sz="1100" dirty="0" err="1">
+                <a:latin typeface="Linux Libertine" panose="02000503000000000000" pitchFamily="2" charset="0"/>
+                <a:ea typeface="Linux Libertine" panose="02000503000000000000" pitchFamily="2" charset="0"/>
+                <a:cs typeface="Linux Libertine" panose="02000503000000000000" pitchFamily="2" charset="0"/>
+              </a:rPr>
               <a:t>Of</a:t>
             </a:r>
             <a:r>
-              <a:rPr lang="de-DE" sz="1100" dirty="0"/>
+              <a:rPr lang="de-DE" sz="1100" dirty="0">
+                <a:latin typeface="Linux Libertine" panose="02000503000000000000" pitchFamily="2" charset="0"/>
+                <a:ea typeface="Linux Libertine" panose="02000503000000000000" pitchFamily="2" charset="0"/>
+                <a:cs typeface="Linux Libertine" panose="02000503000000000000" pitchFamily="2" charset="0"/>
+              </a:rPr>
               <a:t> Code </a:t>
             </a:r>
             <a:r>
-              <a:rPr lang="de-DE" sz="1100" dirty="0" smtClean="0"/>
+              <a:rPr lang="de-DE" sz="1100" dirty="0" smtClean="0">
+                <a:latin typeface="Linux Libertine" panose="02000503000000000000" pitchFamily="2" charset="0"/>
+                <a:ea typeface="Linux Libertine" panose="02000503000000000000" pitchFamily="2" charset="0"/>
+                <a:cs typeface="Linux Libertine" panose="02000503000000000000" pitchFamily="2" charset="0"/>
+              </a:rPr>
               <a:t>= </a:t>
             </a:r>
             <a:r>
-              <a:rPr lang="de-DE" sz="1600" b="1" dirty="0" smtClean="0"/>
-              <a:t>LOC</a:t>
-            </a:r>
-            <a:r>
-              <a:rPr lang="de-DE" sz="1100" dirty="0" smtClean="0"/>
-              <a:t> </a:t>
-            </a:r>
-            <a:endParaRPr lang="en-US" sz="1100" dirty="0"/>
+              <a:rPr lang="de-DE" sz="1400" b="1" dirty="0" smtClean="0">
+                <a:latin typeface="Linux Libertine" panose="02000503000000000000" pitchFamily="2" charset="0"/>
+                <a:ea typeface="Linux Libertine" panose="02000503000000000000" pitchFamily="2" charset="0"/>
+                <a:cs typeface="Linux Libertine" panose="02000503000000000000" pitchFamily="2" charset="0"/>
+              </a:rPr>
+              <a:t># LOC </a:t>
+            </a:r>
+            <a:endParaRPr lang="en-US" sz="1400" b="1" dirty="0">
+              <a:latin typeface="Linux Libertine" panose="02000503000000000000" pitchFamily="2" charset="0"/>
+              <a:ea typeface="Linux Libertine" panose="02000503000000000000" pitchFamily="2" charset="0"/>
+              <a:cs typeface="Linux Libertine" panose="02000503000000000000" pitchFamily="2" charset="0"/>
+            </a:endParaRPr>
           </a:p>
         </p:txBody>
       </p:sp>
@@ -6623,6 +6944,9 @@
               <a:solidFill>
                 <a:schemeClr val="tx1"/>
               </a:solidFill>
+              <a:latin typeface="Linux Libertine" panose="02000503000000000000" pitchFamily="2" charset="0"/>
+              <a:ea typeface="Linux Libertine" panose="02000503000000000000" pitchFamily="2" charset="0"/>
+              <a:cs typeface="Linux Libertine" panose="02000503000000000000" pitchFamily="2" charset="0"/>
             </a:endParaRPr>
           </a:p>
         </p:txBody>
@@ -6673,6 +6997,9 @@
               <a:solidFill>
                 <a:schemeClr val="tx1"/>
               </a:solidFill>
+              <a:latin typeface="Linux Libertine" panose="02000503000000000000" pitchFamily="2" charset="0"/>
+              <a:ea typeface="Linux Libertine" panose="02000503000000000000" pitchFamily="2" charset="0"/>
+              <a:cs typeface="Linux Libertine" panose="02000503000000000000" pitchFamily="2" charset="0"/>
             </a:endParaRPr>
           </a:p>
         </p:txBody>
@@ -6723,6 +7050,9 @@
               <a:solidFill>
                 <a:schemeClr val="tx1"/>
               </a:solidFill>
+              <a:latin typeface="Linux Libertine" panose="02000503000000000000" pitchFamily="2" charset="0"/>
+              <a:ea typeface="Linux Libertine" panose="02000503000000000000" pitchFamily="2" charset="0"/>
+              <a:cs typeface="Linux Libertine" panose="02000503000000000000" pitchFamily="2" charset="0"/>
             </a:endParaRPr>
           </a:p>
         </p:txBody>
@@ -6771,8 +7101,8 @@
         </p:nvSpPr>
         <p:spPr>
           <a:xfrm rot="16200000">
-            <a:off x="9603075" y="3913402"/>
-            <a:ext cx="899221" cy="307777"/>
+            <a:off x="9622119" y="3913402"/>
+            <a:ext cx="861133" cy="307777"/>
           </a:xfrm>
           <a:prstGeom prst="rect">
             <a:avLst/>
@@ -6785,14 +7115,26 @@
           <a:lstStyle/>
           <a:p>
             <a:r>
-              <a:rPr lang="de-DE" sz="1100" dirty="0" smtClean="0"/>
+              <a:rPr lang="de-DE" sz="1100" dirty="0" smtClean="0">
+                <a:latin typeface="Linux Libertine" panose="02000503000000000000" pitchFamily="2" charset="0"/>
+                <a:ea typeface="Linux Libertine" panose="02000503000000000000" pitchFamily="2" charset="0"/>
+                <a:cs typeface="Linux Libertine" panose="02000503000000000000" pitchFamily="2" charset="0"/>
+              </a:rPr>
               <a:t># </a:t>
             </a:r>
             <a:r>
-              <a:rPr lang="de-DE" sz="1400" b="1" dirty="0" err="1" smtClean="0"/>
+              <a:rPr lang="de-DE" sz="1400" b="1" dirty="0" err="1" smtClean="0">
+                <a:latin typeface="Linux Libertine" panose="02000503000000000000" pitchFamily="2" charset="0"/>
+                <a:ea typeface="Linux Libertine" panose="02000503000000000000" pitchFamily="2" charset="0"/>
+                <a:cs typeface="Linux Libertine" panose="02000503000000000000" pitchFamily="2" charset="0"/>
+              </a:rPr>
               <a:t>features</a:t>
             </a:r>
-            <a:endParaRPr lang="en-US" sz="1400" b="1" dirty="0"/>
+            <a:endParaRPr lang="en-US" sz="1400" b="1" dirty="0">
+              <a:latin typeface="Linux Libertine" panose="02000503000000000000" pitchFamily="2" charset="0"/>
+              <a:ea typeface="Linux Libertine" panose="02000503000000000000" pitchFamily="2" charset="0"/>
+              <a:cs typeface="Linux Libertine" panose="02000503000000000000" pitchFamily="2" charset="0"/>
+            </a:endParaRPr>
           </a:p>
         </p:txBody>
       </p:sp>
@@ -6842,6 +7184,9 @@
               <a:solidFill>
                 <a:schemeClr val="tx1"/>
               </a:solidFill>
+              <a:latin typeface="Linux Libertine" panose="02000503000000000000" pitchFamily="2" charset="0"/>
+              <a:ea typeface="Linux Libertine" panose="02000503000000000000" pitchFamily="2" charset="0"/>
+              <a:cs typeface="Linux Libertine" panose="02000503000000000000" pitchFamily="2" charset="0"/>
             </a:endParaRPr>
           </a:p>
         </p:txBody>
@@ -6892,6 +7237,9 @@
               <a:solidFill>
                 <a:schemeClr val="tx1"/>
               </a:solidFill>
+              <a:latin typeface="Linux Libertine" panose="02000503000000000000" pitchFamily="2" charset="0"/>
+              <a:ea typeface="Linux Libertine" panose="02000503000000000000" pitchFamily="2" charset="0"/>
+              <a:cs typeface="Linux Libertine" panose="02000503000000000000" pitchFamily="2" charset="0"/>
             </a:endParaRPr>
           </a:p>
         </p:txBody>
@@ -6942,6 +7290,9 @@
               <a:solidFill>
                 <a:schemeClr val="tx1"/>
               </a:solidFill>
+              <a:latin typeface="Linux Libertine" panose="02000503000000000000" pitchFamily="2" charset="0"/>
+              <a:ea typeface="Linux Libertine" panose="02000503000000000000" pitchFamily="2" charset="0"/>
+              <a:cs typeface="Linux Libertine" panose="02000503000000000000" pitchFamily="2" charset="0"/>
             </a:endParaRPr>
           </a:p>
         </p:txBody>
@@ -6992,6 +7343,9 @@
               <a:solidFill>
                 <a:schemeClr val="tx1"/>
               </a:solidFill>
+              <a:latin typeface="Linux Libertine" panose="02000503000000000000" pitchFamily="2" charset="0"/>
+              <a:ea typeface="Linux Libertine" panose="02000503000000000000" pitchFamily="2" charset="0"/>
+              <a:cs typeface="Linux Libertine" panose="02000503000000000000" pitchFamily="2" charset="0"/>
             </a:endParaRPr>
           </a:p>
         </p:txBody>
@@ -7042,6 +7396,9 @@
               <a:solidFill>
                 <a:schemeClr val="tx1"/>
               </a:solidFill>
+              <a:latin typeface="Linux Libertine" panose="02000503000000000000" pitchFamily="2" charset="0"/>
+              <a:ea typeface="Linux Libertine" panose="02000503000000000000" pitchFamily="2" charset="0"/>
+              <a:cs typeface="Linux Libertine" panose="02000503000000000000" pitchFamily="2" charset="0"/>
             </a:endParaRPr>
           </a:p>
         </p:txBody>
@@ -7054,8 +7411,8 @@
         </p:nvSpPr>
         <p:spPr>
           <a:xfrm>
-            <a:off x="1745589" y="1223528"/>
-            <a:ext cx="1080061" cy="646331"/>
+            <a:off x="2096055" y="1185579"/>
+            <a:ext cx="1080061" cy="523220"/>
           </a:xfrm>
           <a:prstGeom prst="rect">
             <a:avLst/>
@@ -7069,20 +7426,36 @@
           <a:lstStyle/>
           <a:p>
             <a:r>
-              <a:rPr lang="de-DE" b="1" dirty="0" smtClean="0"/>
+              <a:rPr lang="de-DE" sz="1400" b="1" dirty="0" smtClean="0">
+                <a:latin typeface="Linux Libertine" panose="02000503000000000000" pitchFamily="2" charset="0"/>
+                <a:ea typeface="Linux Libertine" panose="02000503000000000000" pitchFamily="2" charset="0"/>
+                <a:cs typeface="Linux Libertine" panose="02000503000000000000" pitchFamily="2" charset="0"/>
+              </a:rPr>
               <a:t>Content</a:t>
             </a:r>
           </a:p>
           <a:p>
             <a:r>
-              <a:rPr lang="de-DE" b="1" dirty="0" err="1" smtClean="0"/>
+              <a:rPr lang="de-DE" sz="1400" b="1" dirty="0" err="1" smtClean="0">
+                <a:latin typeface="Linux Libertine" panose="02000503000000000000" pitchFamily="2" charset="0"/>
+                <a:ea typeface="Linux Libertine" panose="02000503000000000000" pitchFamily="2" charset="0"/>
+                <a:cs typeface="Linux Libertine" panose="02000503000000000000" pitchFamily="2" charset="0"/>
+              </a:rPr>
               <a:t>of</a:t>
             </a:r>
             <a:r>
-              <a:rPr lang="de-DE" b="1" dirty="0" smtClean="0"/>
+              <a:rPr lang="de-DE" sz="1400" b="1" dirty="0" smtClean="0">
+                <a:latin typeface="Linux Libertine" panose="02000503000000000000" pitchFamily="2" charset="0"/>
+                <a:ea typeface="Linux Libertine" panose="02000503000000000000" pitchFamily="2" charset="0"/>
+                <a:cs typeface="Linux Libertine" panose="02000503000000000000" pitchFamily="2" charset="0"/>
+              </a:rPr>
               <a:t> SPL</a:t>
             </a:r>
-            <a:endParaRPr lang="en-US" b="1" dirty="0"/>
+            <a:endParaRPr lang="en-US" sz="1400" b="1" dirty="0">
+              <a:latin typeface="Linux Libertine" panose="02000503000000000000" pitchFamily="2" charset="0"/>
+              <a:ea typeface="Linux Libertine" panose="02000503000000000000" pitchFamily="2" charset="0"/>
+              <a:cs typeface="Linux Libertine" panose="02000503000000000000" pitchFamily="2" charset="0"/>
+            </a:endParaRPr>
           </a:p>
         </p:txBody>
       </p:sp>
@@ -7132,6 +7505,9 @@
               <a:solidFill>
                 <a:schemeClr val="tx1"/>
               </a:solidFill>
+              <a:latin typeface="Linux Libertine" panose="02000503000000000000" pitchFamily="2" charset="0"/>
+              <a:ea typeface="Linux Libertine" panose="02000503000000000000" pitchFamily="2" charset="0"/>
+              <a:cs typeface="Linux Libertine" panose="02000503000000000000" pitchFamily="2" charset="0"/>
             </a:endParaRPr>
           </a:p>
         </p:txBody>
@@ -7260,6 +7636,9 @@
               <a:solidFill>
                 <a:schemeClr val="tx1"/>
               </a:solidFill>
+              <a:latin typeface="Linux Libertine" panose="02000503000000000000" pitchFamily="2" charset="0"/>
+              <a:ea typeface="Linux Libertine" panose="02000503000000000000" pitchFamily="2" charset="0"/>
+              <a:cs typeface="Linux Libertine" panose="02000503000000000000" pitchFamily="2" charset="0"/>
             </a:endParaRPr>
           </a:p>
         </p:txBody>
@@ -7374,6 +7753,9 @@
               <a:solidFill>
                 <a:schemeClr val="tx1"/>
               </a:solidFill>
+              <a:latin typeface="Linux Libertine" panose="02000503000000000000" pitchFamily="2" charset="0"/>
+              <a:ea typeface="Linux Libertine" panose="02000503000000000000" pitchFamily="2" charset="0"/>
+              <a:cs typeface="Linux Libertine" panose="02000503000000000000" pitchFamily="2" charset="0"/>
             </a:endParaRPr>
           </a:p>
         </p:txBody>
@@ -7738,6 +8120,9 @@
               <a:solidFill>
                 <a:schemeClr val="tx1"/>
               </a:solidFill>
+              <a:latin typeface="Linux Libertine" panose="02000503000000000000" pitchFamily="2" charset="0"/>
+              <a:ea typeface="Linux Libertine" panose="02000503000000000000" pitchFamily="2" charset="0"/>
+              <a:cs typeface="Linux Libertine" panose="02000503000000000000" pitchFamily="2" charset="0"/>
             </a:endParaRPr>
           </a:p>
         </p:txBody>
@@ -7788,6 +8173,9 @@
               <a:solidFill>
                 <a:schemeClr val="tx1"/>
               </a:solidFill>
+              <a:latin typeface="Linux Libertine" panose="02000503000000000000" pitchFamily="2" charset="0"/>
+              <a:ea typeface="Linux Libertine" panose="02000503000000000000" pitchFamily="2" charset="0"/>
+              <a:cs typeface="Linux Libertine" panose="02000503000000000000" pitchFamily="2" charset="0"/>
             </a:endParaRPr>
           </a:p>
         </p:txBody>
@@ -7838,6 +8226,9 @@
               <a:solidFill>
                 <a:schemeClr val="tx1"/>
               </a:solidFill>
+              <a:latin typeface="Linux Libertine" panose="02000503000000000000" pitchFamily="2" charset="0"/>
+              <a:ea typeface="Linux Libertine" panose="02000503000000000000" pitchFamily="2" charset="0"/>
+              <a:cs typeface="Linux Libertine" panose="02000503000000000000" pitchFamily="2" charset="0"/>
             </a:endParaRPr>
           </a:p>
         </p:txBody>
@@ -7850,7 +8241,7 @@
         </p:nvSpPr>
         <p:spPr>
           <a:xfrm>
-            <a:off x="7778943" y="4566575"/>
+            <a:off x="7863055" y="4627165"/>
             <a:ext cx="1185581" cy="738664"/>
           </a:xfrm>
           <a:prstGeom prst="rect">
@@ -7865,40 +8256,76 @@
           <a:lstStyle/>
           <a:p>
             <a:r>
-              <a:rPr lang="de-DE" sz="1400" b="1" dirty="0" smtClean="0"/>
+              <a:rPr lang="de-DE" sz="1400" dirty="0" smtClean="0">
+                <a:latin typeface="Linux Libertine" panose="02000503000000000000" pitchFamily="2" charset="0"/>
+                <a:ea typeface="Linux Libertine" panose="02000503000000000000" pitchFamily="2" charset="0"/>
+                <a:cs typeface="Linux Libertine" panose="02000503000000000000" pitchFamily="2" charset="0"/>
+              </a:rPr>
               <a:t>Content</a:t>
             </a:r>
           </a:p>
           <a:p>
             <a:r>
-              <a:rPr lang="de-DE" sz="1400" b="1" dirty="0" err="1"/>
+              <a:rPr lang="de-DE" sz="1400" dirty="0" err="1">
+                <a:latin typeface="Linux Libertine" panose="02000503000000000000" pitchFamily="2" charset="0"/>
+                <a:ea typeface="Linux Libertine" panose="02000503000000000000" pitchFamily="2" charset="0"/>
+                <a:cs typeface="Linux Libertine" panose="02000503000000000000" pitchFamily="2" charset="0"/>
+              </a:rPr>
               <a:t>o</a:t>
             </a:r>
             <a:r>
-              <a:rPr lang="de-DE" sz="1400" b="1" dirty="0" err="1" smtClean="0"/>
+              <a:rPr lang="de-DE" sz="1400" dirty="0" err="1" smtClean="0">
+                <a:latin typeface="Linux Libertine" panose="02000503000000000000" pitchFamily="2" charset="0"/>
+                <a:ea typeface="Linux Libertine" panose="02000503000000000000" pitchFamily="2" charset="0"/>
+                <a:cs typeface="Linux Libertine" panose="02000503000000000000" pitchFamily="2" charset="0"/>
+              </a:rPr>
               <a:t>f</a:t>
             </a:r>
             <a:r>
-              <a:rPr lang="de-DE" sz="1400" b="1" dirty="0" smtClean="0"/>
+              <a:rPr lang="de-DE" sz="1400" dirty="0" smtClean="0">
+                <a:latin typeface="Linux Libertine" panose="02000503000000000000" pitchFamily="2" charset="0"/>
+                <a:ea typeface="Linux Libertine" panose="02000503000000000000" pitchFamily="2" charset="0"/>
+                <a:cs typeface="Linux Libertine" panose="02000503000000000000" pitchFamily="2" charset="0"/>
+              </a:rPr>
               <a:t> </a:t>
             </a:r>
             <a:r>
-              <a:rPr lang="de-DE" sz="1400" b="1" dirty="0" err="1"/>
+              <a:rPr lang="de-DE" sz="1400" dirty="0" err="1">
+                <a:latin typeface="Linux Libertine" panose="02000503000000000000" pitchFamily="2" charset="0"/>
+                <a:ea typeface="Linux Libertine" panose="02000503000000000000" pitchFamily="2" charset="0"/>
+                <a:cs typeface="Linux Libertine" panose="02000503000000000000" pitchFamily="2" charset="0"/>
+              </a:rPr>
               <a:t>i</a:t>
             </a:r>
             <a:r>
-              <a:rPr lang="de-DE" sz="1400" b="1" dirty="0" err="1" smtClean="0"/>
+              <a:rPr lang="de-DE" sz="1400" dirty="0" err="1" smtClean="0">
+                <a:latin typeface="Linux Libertine" panose="02000503000000000000" pitchFamily="2" charset="0"/>
+                <a:ea typeface="Linux Libertine" panose="02000503000000000000" pitchFamily="2" charset="0"/>
+                <a:cs typeface="Linux Libertine" panose="02000503000000000000" pitchFamily="2" charset="0"/>
+              </a:rPr>
               <a:t>solated</a:t>
             </a:r>
-            <a:endParaRPr lang="de-DE" sz="1400" b="1" dirty="0" smtClean="0"/>
-          </a:p>
-          <a:p>
-            <a:r>
-              <a:rPr lang="de-DE" sz="1400" b="1" dirty="0" err="1" smtClean="0"/>
+            <a:endParaRPr lang="de-DE" sz="1400" dirty="0" smtClean="0">
+              <a:latin typeface="Linux Libertine" panose="02000503000000000000" pitchFamily="2" charset="0"/>
+              <a:ea typeface="Linux Libertine" panose="02000503000000000000" pitchFamily="2" charset="0"/>
+              <a:cs typeface="Linux Libertine" panose="02000503000000000000" pitchFamily="2" charset="0"/>
+            </a:endParaRPr>
+          </a:p>
+          <a:p>
+            <a:r>
+              <a:rPr lang="de-DE" sz="1400" dirty="0" err="1" smtClean="0">
+                <a:latin typeface="Linux Libertine" panose="02000503000000000000" pitchFamily="2" charset="0"/>
+                <a:ea typeface="Linux Libertine" panose="02000503000000000000" pitchFamily="2" charset="0"/>
+                <a:cs typeface="Linux Libertine" panose="02000503000000000000" pitchFamily="2" charset="0"/>
+              </a:rPr>
               <a:t>component</a:t>
             </a:r>
             <a:r>
-              <a:rPr lang="de-DE" sz="1400" b="1" dirty="0" smtClean="0"/>
+              <a:rPr lang="de-DE" sz="1400" dirty="0" smtClean="0">
+                <a:latin typeface="Linux Libertine" panose="02000503000000000000" pitchFamily="2" charset="0"/>
+                <a:ea typeface="Linux Libertine" panose="02000503000000000000" pitchFamily="2" charset="0"/>
+                <a:cs typeface="Linux Libertine" panose="02000503000000000000" pitchFamily="2" charset="0"/>
+              </a:rPr>
               <a:t> A</a:t>
             </a:r>
           </a:p>
@@ -7912,7 +8339,7 @@
         </p:nvSpPr>
         <p:spPr>
           <a:xfrm>
-            <a:off x="7785751" y="5402995"/>
+            <a:off x="7877241" y="5465079"/>
             <a:ext cx="1177566" cy="738664"/>
           </a:xfrm>
           <a:prstGeom prst="rect">
@@ -7927,44 +8354,84 @@
           <a:lstStyle/>
           <a:p>
             <a:r>
-              <a:rPr lang="de-DE" sz="1400" b="1" dirty="0" smtClean="0"/>
+              <a:rPr lang="de-DE" sz="1400" dirty="0" smtClean="0">
+                <a:latin typeface="Linux Libertine" panose="02000503000000000000" pitchFamily="2" charset="0"/>
+                <a:ea typeface="Linux Libertine" panose="02000503000000000000" pitchFamily="2" charset="0"/>
+                <a:cs typeface="Linux Libertine" panose="02000503000000000000" pitchFamily="2" charset="0"/>
+              </a:rPr>
               <a:t>Content</a:t>
             </a:r>
           </a:p>
           <a:p>
             <a:r>
-              <a:rPr lang="de-DE" sz="1400" b="1" dirty="0" err="1"/>
+              <a:rPr lang="de-DE" sz="1400" dirty="0" err="1">
+                <a:latin typeface="Linux Libertine" panose="02000503000000000000" pitchFamily="2" charset="0"/>
+                <a:ea typeface="Linux Libertine" panose="02000503000000000000" pitchFamily="2" charset="0"/>
+                <a:cs typeface="Linux Libertine" panose="02000503000000000000" pitchFamily="2" charset="0"/>
+              </a:rPr>
               <a:t>o</a:t>
             </a:r>
             <a:r>
-              <a:rPr lang="de-DE" sz="1400" b="1" dirty="0" err="1" smtClean="0"/>
+              <a:rPr lang="de-DE" sz="1400" dirty="0" err="1" smtClean="0">
+                <a:latin typeface="Linux Libertine" panose="02000503000000000000" pitchFamily="2" charset="0"/>
+                <a:ea typeface="Linux Libertine" panose="02000503000000000000" pitchFamily="2" charset="0"/>
+                <a:cs typeface="Linux Libertine" panose="02000503000000000000" pitchFamily="2" charset="0"/>
+              </a:rPr>
               <a:t>f</a:t>
             </a:r>
             <a:r>
-              <a:rPr lang="de-DE" sz="1400" b="1" dirty="0" smtClean="0"/>
+              <a:rPr lang="de-DE" sz="1400" dirty="0" smtClean="0">
+                <a:latin typeface="Linux Libertine" panose="02000503000000000000" pitchFamily="2" charset="0"/>
+                <a:ea typeface="Linux Libertine" panose="02000503000000000000" pitchFamily="2" charset="0"/>
+                <a:cs typeface="Linux Libertine" panose="02000503000000000000" pitchFamily="2" charset="0"/>
+              </a:rPr>
               <a:t> </a:t>
             </a:r>
             <a:r>
-              <a:rPr lang="de-DE" sz="1400" b="1" dirty="0" err="1"/>
+              <a:rPr lang="de-DE" sz="1400" dirty="0" err="1">
+                <a:latin typeface="Linux Libertine" panose="02000503000000000000" pitchFamily="2" charset="0"/>
+                <a:ea typeface="Linux Libertine" panose="02000503000000000000" pitchFamily="2" charset="0"/>
+                <a:cs typeface="Linux Libertine" panose="02000503000000000000" pitchFamily="2" charset="0"/>
+              </a:rPr>
               <a:t>i</a:t>
             </a:r>
             <a:r>
-              <a:rPr lang="de-DE" sz="1400" b="1" dirty="0" err="1" smtClean="0"/>
+              <a:rPr lang="de-DE" sz="1400" dirty="0" err="1" smtClean="0">
+                <a:latin typeface="Linux Libertine" panose="02000503000000000000" pitchFamily="2" charset="0"/>
+                <a:ea typeface="Linux Libertine" panose="02000503000000000000" pitchFamily="2" charset="0"/>
+                <a:cs typeface="Linux Libertine" panose="02000503000000000000" pitchFamily="2" charset="0"/>
+              </a:rPr>
               <a:t>solated</a:t>
             </a:r>
-            <a:endParaRPr lang="de-DE" sz="1400" b="1" dirty="0" smtClean="0"/>
-          </a:p>
-          <a:p>
-            <a:r>
-              <a:rPr lang="de-DE" sz="1400" b="1" dirty="0" err="1"/>
+            <a:endParaRPr lang="de-DE" sz="1400" dirty="0" smtClean="0">
+              <a:latin typeface="Linux Libertine" panose="02000503000000000000" pitchFamily="2" charset="0"/>
+              <a:ea typeface="Linux Libertine" panose="02000503000000000000" pitchFamily="2" charset="0"/>
+              <a:cs typeface="Linux Libertine" panose="02000503000000000000" pitchFamily="2" charset="0"/>
+            </a:endParaRPr>
+          </a:p>
+          <a:p>
+            <a:r>
+              <a:rPr lang="de-DE" sz="1400" dirty="0" err="1">
+                <a:latin typeface="Linux Libertine" panose="02000503000000000000" pitchFamily="2" charset="0"/>
+                <a:ea typeface="Linux Libertine" panose="02000503000000000000" pitchFamily="2" charset="0"/>
+                <a:cs typeface="Linux Libertine" panose="02000503000000000000" pitchFamily="2" charset="0"/>
+              </a:rPr>
               <a:t>c</a:t>
             </a:r>
             <a:r>
-              <a:rPr lang="de-DE" sz="1400" b="1" dirty="0" err="1" smtClean="0"/>
+              <a:rPr lang="de-DE" sz="1400" dirty="0" err="1" smtClean="0">
+                <a:latin typeface="Linux Libertine" panose="02000503000000000000" pitchFamily="2" charset="0"/>
+                <a:ea typeface="Linux Libertine" panose="02000503000000000000" pitchFamily="2" charset="0"/>
+                <a:cs typeface="Linux Libertine" panose="02000503000000000000" pitchFamily="2" charset="0"/>
+              </a:rPr>
               <a:t>omponent</a:t>
             </a:r>
             <a:r>
-              <a:rPr lang="de-DE" sz="1400" b="1" dirty="0" smtClean="0"/>
+              <a:rPr lang="de-DE" sz="1400" dirty="0" smtClean="0">
+                <a:latin typeface="Linux Libertine" panose="02000503000000000000" pitchFamily="2" charset="0"/>
+                <a:ea typeface="Linux Libertine" panose="02000503000000000000" pitchFamily="2" charset="0"/>
+                <a:cs typeface="Linux Libertine" panose="02000503000000000000" pitchFamily="2" charset="0"/>
+              </a:rPr>
               <a:t> B</a:t>
             </a:r>
           </a:p>
@@ -7978,8 +8445,8 @@
         </p:nvSpPr>
         <p:spPr>
           <a:xfrm>
-            <a:off x="1754098" y="4548737"/>
-            <a:ext cx="6028914" cy="1754326"/>
+            <a:off x="2098824" y="4724101"/>
+            <a:ext cx="5684188" cy="1384995"/>
           </a:xfrm>
           <a:prstGeom prst="rect">
             <a:avLst/>
@@ -7993,169 +8460,340 @@
           <a:lstStyle/>
           <a:p>
             <a:r>
-              <a:rPr lang="de-DE" dirty="0" smtClean="0"/>
+              <a:rPr lang="de-DE" sz="1400" dirty="0" smtClean="0">
+                <a:latin typeface="Linux Libertine" panose="02000503000000000000" pitchFamily="2" charset="0"/>
+                <a:ea typeface="Linux Libertine" panose="02000503000000000000" pitchFamily="2" charset="0"/>
+                <a:cs typeface="Linux Libertine" panose="02000503000000000000" pitchFamily="2" charset="0"/>
+              </a:rPr>
               <a:t>Legend </a:t>
             </a:r>
             <a:r>
-              <a:rPr lang="de-DE" dirty="0" err="1" smtClean="0"/>
+              <a:rPr lang="de-DE" sz="1400" dirty="0" err="1" smtClean="0">
+                <a:latin typeface="Linux Libertine" panose="02000503000000000000" pitchFamily="2" charset="0"/>
+                <a:ea typeface="Linux Libertine" panose="02000503000000000000" pitchFamily="2" charset="0"/>
+                <a:cs typeface="Linux Libertine" panose="02000503000000000000" pitchFamily="2" charset="0"/>
+              </a:rPr>
               <a:t>of</a:t>
             </a:r>
             <a:r>
-              <a:rPr lang="de-DE" dirty="0" smtClean="0"/>
+              <a:rPr lang="de-DE" sz="1400" dirty="0" smtClean="0">
+                <a:latin typeface="Linux Libertine" panose="02000503000000000000" pitchFamily="2" charset="0"/>
+                <a:ea typeface="Linux Libertine" panose="02000503000000000000" pitchFamily="2" charset="0"/>
+                <a:cs typeface="Linux Libertine" panose="02000503000000000000" pitchFamily="2" charset="0"/>
+              </a:rPr>
               <a:t> </a:t>
             </a:r>
             <a:r>
-              <a:rPr lang="de-DE" dirty="0" err="1" smtClean="0"/>
+              <a:rPr lang="de-DE" sz="1400" dirty="0" err="1" smtClean="0">
+                <a:latin typeface="Linux Libertine" panose="02000503000000000000" pitchFamily="2" charset="0"/>
+                <a:ea typeface="Linux Libertine" panose="02000503000000000000" pitchFamily="2" charset="0"/>
+                <a:cs typeface="Linux Libertine" panose="02000503000000000000" pitchFamily="2" charset="0"/>
+              </a:rPr>
               <a:t>migration</a:t>
             </a:r>
             <a:r>
-              <a:rPr lang="de-DE" dirty="0" smtClean="0"/>
+              <a:rPr lang="de-DE" sz="1400" dirty="0" smtClean="0">
+                <a:latin typeface="Linux Libertine" panose="02000503000000000000" pitchFamily="2" charset="0"/>
+                <a:ea typeface="Linux Libertine" panose="02000503000000000000" pitchFamily="2" charset="0"/>
+                <a:cs typeface="Linux Libertine" panose="02000503000000000000" pitchFamily="2" charset="0"/>
+              </a:rPr>
               <a:t> </a:t>
             </a:r>
             <a:r>
-              <a:rPr lang="de-DE" smtClean="0"/>
-              <a:t>steps:</a:t>
-            </a:r>
-            <a:endParaRPr lang="de-DE" dirty="0" smtClean="0"/>
+              <a:rPr lang="de-DE" sz="1400" dirty="0" err="1" smtClean="0">
+                <a:latin typeface="Linux Libertine" panose="02000503000000000000" pitchFamily="2" charset="0"/>
+                <a:ea typeface="Linux Libertine" panose="02000503000000000000" pitchFamily="2" charset="0"/>
+                <a:cs typeface="Linux Libertine" panose="02000503000000000000" pitchFamily="2" charset="0"/>
+              </a:rPr>
+              <a:t>steps</a:t>
+            </a:r>
+            <a:r>
+              <a:rPr lang="de-DE" sz="1400" dirty="0" smtClean="0">
+                <a:latin typeface="Linux Libertine" panose="02000503000000000000" pitchFamily="2" charset="0"/>
+                <a:ea typeface="Linux Libertine" panose="02000503000000000000" pitchFamily="2" charset="0"/>
+                <a:cs typeface="Linux Libertine" panose="02000503000000000000" pitchFamily="2" charset="0"/>
+              </a:rPr>
+              <a:t>:</a:t>
+            </a:r>
           </a:p>
           <a:p>
             <a:pPr marL="342900" indent="-342900">
               <a:buAutoNum type="arabicParenBoth"/>
             </a:pPr>
             <a:r>
-              <a:rPr lang="de-DE" dirty="0" smtClean="0"/>
+              <a:rPr lang="de-DE" sz="1400" dirty="0" smtClean="0">
+                <a:latin typeface="Linux Libertine" panose="02000503000000000000" pitchFamily="2" charset="0"/>
+                <a:ea typeface="Linux Libertine" panose="02000503000000000000" pitchFamily="2" charset="0"/>
+                <a:cs typeface="Linux Libertine" panose="02000503000000000000" pitchFamily="2" charset="0"/>
+              </a:rPr>
               <a:t> Import </a:t>
             </a:r>
             <a:r>
-              <a:rPr lang="de-DE" dirty="0" err="1" smtClean="0"/>
+              <a:rPr lang="de-DE" sz="1400" dirty="0" err="1" smtClean="0">
+                <a:latin typeface="Linux Libertine" panose="02000503000000000000" pitchFamily="2" charset="0"/>
+                <a:ea typeface="Linux Libertine" panose="02000503000000000000" pitchFamily="2" charset="0"/>
+                <a:cs typeface="Linux Libertine" panose="02000503000000000000" pitchFamily="2" charset="0"/>
+              </a:rPr>
               <a:t>for</a:t>
             </a:r>
             <a:r>
-              <a:rPr lang="de-DE" dirty="0" smtClean="0"/>
+              <a:rPr lang="de-DE" sz="1400" dirty="0" smtClean="0">
+                <a:latin typeface="Linux Libertine" panose="02000503000000000000" pitchFamily="2" charset="0"/>
+                <a:ea typeface="Linux Libertine" panose="02000503000000000000" pitchFamily="2" charset="0"/>
+                <a:cs typeface="Linux Libertine" panose="02000503000000000000" pitchFamily="2" charset="0"/>
+              </a:rPr>
               <a:t> </a:t>
             </a:r>
             <a:r>
-              <a:rPr lang="de-DE" b="1" dirty="0" err="1" smtClean="0"/>
+              <a:rPr lang="de-DE" sz="1400" b="1" dirty="0" err="1" smtClean="0">
+                <a:latin typeface="Linux Libertine" panose="02000503000000000000" pitchFamily="2" charset="0"/>
+                <a:ea typeface="Linux Libertine" panose="02000503000000000000" pitchFamily="2" charset="0"/>
+                <a:cs typeface="Linux Libertine" panose="02000503000000000000" pitchFamily="2" charset="0"/>
+              </a:rPr>
               <a:t>Complexity</a:t>
             </a:r>
             <a:r>
-              <a:rPr lang="de-DE" b="1" dirty="0" smtClean="0"/>
+              <a:rPr lang="de-DE" sz="1400" b="1" dirty="0" smtClean="0">
+                <a:latin typeface="Linux Libertine" panose="02000503000000000000" pitchFamily="2" charset="0"/>
+                <a:ea typeface="Linux Libertine" panose="02000503000000000000" pitchFamily="2" charset="0"/>
+                <a:cs typeface="Linux Libertine" panose="02000503000000000000" pitchFamily="2" charset="0"/>
+              </a:rPr>
               <a:t> </a:t>
             </a:r>
             <a:r>
-              <a:rPr lang="de-DE" b="1" dirty="0" err="1"/>
+              <a:rPr lang="de-DE" sz="1400" b="1" dirty="0" err="1">
+                <a:latin typeface="Linux Libertine" panose="02000503000000000000" pitchFamily="2" charset="0"/>
+                <a:ea typeface="Linux Libertine" panose="02000503000000000000" pitchFamily="2" charset="0"/>
+                <a:cs typeface="Linux Libertine" panose="02000503000000000000" pitchFamily="2" charset="0"/>
+              </a:rPr>
               <a:t>R</a:t>
             </a:r>
             <a:r>
-              <a:rPr lang="de-DE" b="1" dirty="0" err="1" smtClean="0"/>
+              <a:rPr lang="de-DE" sz="1400" b="1" dirty="0" err="1" smtClean="0">
+                <a:latin typeface="Linux Libertine" panose="02000503000000000000" pitchFamily="2" charset="0"/>
+                <a:ea typeface="Linux Libertine" panose="02000503000000000000" pitchFamily="2" charset="0"/>
+                <a:cs typeface="Linux Libertine" panose="02000503000000000000" pitchFamily="2" charset="0"/>
+              </a:rPr>
               <a:t>eduction</a:t>
             </a:r>
-            <a:endParaRPr lang="de-DE" b="1" dirty="0" smtClean="0"/>
+            <a:endParaRPr lang="de-DE" sz="1400" b="1" dirty="0" smtClean="0">
+              <a:latin typeface="Linux Libertine" panose="02000503000000000000" pitchFamily="2" charset="0"/>
+              <a:ea typeface="Linux Libertine" panose="02000503000000000000" pitchFamily="2" charset="0"/>
+              <a:cs typeface="Linux Libertine" panose="02000503000000000000" pitchFamily="2" charset="0"/>
+            </a:endParaRPr>
           </a:p>
           <a:p>
             <a:pPr marL="342900" indent="-342900">
               <a:buAutoNum type="arabicParenBoth"/>
             </a:pPr>
             <a:r>
-              <a:rPr lang="de-DE" dirty="0"/>
+              <a:rPr lang="de-DE" sz="1400" dirty="0" smtClean="0">
+                <a:latin typeface="Linux Libertine" panose="02000503000000000000" pitchFamily="2" charset="0"/>
+                <a:ea typeface="Linux Libertine" panose="02000503000000000000" pitchFamily="2" charset="0"/>
+                <a:cs typeface="Linux Libertine" panose="02000503000000000000" pitchFamily="2" charset="0"/>
+              </a:rPr>
               <a:t> </a:t>
             </a:r>
             <a:r>
-              <a:rPr lang="de-DE" b="1" dirty="0" err="1" smtClean="0"/>
+              <a:rPr lang="de-DE" sz="1400" b="1" dirty="0" err="1" smtClean="0">
+                <a:latin typeface="Linux Libertine" panose="02000503000000000000" pitchFamily="2" charset="0"/>
+                <a:ea typeface="Linux Libertine" panose="02000503000000000000" pitchFamily="2" charset="0"/>
+                <a:cs typeface="Linux Libertine" panose="02000503000000000000" pitchFamily="2" charset="0"/>
+              </a:rPr>
               <a:t>Modularization</a:t>
             </a:r>
             <a:r>
-              <a:rPr lang="de-DE" dirty="0" smtClean="0"/>
+              <a:rPr lang="de-DE" sz="1400" dirty="0" smtClean="0">
+                <a:latin typeface="Linux Libertine" panose="02000503000000000000" pitchFamily="2" charset="0"/>
+                <a:ea typeface="Linux Libertine" panose="02000503000000000000" pitchFamily="2" charset="0"/>
+                <a:cs typeface="Linux Libertine" panose="02000503000000000000" pitchFamily="2" charset="0"/>
+              </a:rPr>
               <a:t> </a:t>
             </a:r>
             <a:r>
-              <a:rPr lang="de-DE" dirty="0" err="1" smtClean="0"/>
+              <a:rPr lang="de-DE" sz="1400" dirty="0" err="1" smtClean="0">
+                <a:latin typeface="Linux Libertine" panose="02000503000000000000" pitchFamily="2" charset="0"/>
+                <a:ea typeface="Linux Libertine" panose="02000503000000000000" pitchFamily="2" charset="0"/>
+                <a:cs typeface="Linux Libertine" panose="02000503000000000000" pitchFamily="2" charset="0"/>
+              </a:rPr>
               <a:t>using</a:t>
             </a:r>
             <a:r>
-              <a:rPr lang="de-DE" dirty="0" smtClean="0"/>
+              <a:rPr lang="de-DE" sz="1400" dirty="0" smtClean="0">
+                <a:latin typeface="Linux Libertine" panose="02000503000000000000" pitchFamily="2" charset="0"/>
+                <a:ea typeface="Linux Libertine" panose="02000503000000000000" pitchFamily="2" charset="0"/>
+                <a:cs typeface="Linux Libertine" panose="02000503000000000000" pitchFamily="2" charset="0"/>
+              </a:rPr>
               <a:t> </a:t>
             </a:r>
             <a:r>
-              <a:rPr lang="de-DE" dirty="0" err="1" smtClean="0"/>
+              <a:rPr lang="de-DE" sz="1400" dirty="0" err="1" smtClean="0">
+                <a:latin typeface="Linux Libertine" panose="02000503000000000000" pitchFamily="2" charset="0"/>
+                <a:ea typeface="Linux Libertine" panose="02000503000000000000" pitchFamily="2" charset="0"/>
+                <a:cs typeface="Linux Libertine" panose="02000503000000000000" pitchFamily="2" charset="0"/>
+              </a:rPr>
               <a:t>configurable</a:t>
             </a:r>
             <a:r>
-              <a:rPr lang="de-DE" dirty="0" smtClean="0"/>
+              <a:rPr lang="de-DE" sz="1400" dirty="0" smtClean="0">
+                <a:latin typeface="Linux Libertine" panose="02000503000000000000" pitchFamily="2" charset="0"/>
+                <a:ea typeface="Linux Libertine" panose="02000503000000000000" pitchFamily="2" charset="0"/>
+                <a:cs typeface="Linux Libertine" panose="02000503000000000000" pitchFamily="2" charset="0"/>
+              </a:rPr>
               <a:t> </a:t>
             </a:r>
             <a:r>
-              <a:rPr lang="de-DE" dirty="0" err="1" smtClean="0"/>
+              <a:rPr lang="de-DE" sz="1400" dirty="0" err="1" smtClean="0">
+                <a:latin typeface="Linux Libertine" panose="02000503000000000000" pitchFamily="2" charset="0"/>
+                <a:ea typeface="Linux Libertine" panose="02000503000000000000" pitchFamily="2" charset="0"/>
+                <a:cs typeface="Linux Libertine" panose="02000503000000000000" pitchFamily="2" charset="0"/>
+              </a:rPr>
               <a:t>sources</a:t>
             </a:r>
-            <a:endParaRPr lang="de-DE" dirty="0" smtClean="0"/>
+            <a:endParaRPr lang="de-DE" sz="1400" dirty="0" smtClean="0">
+              <a:latin typeface="Linux Libertine" panose="02000503000000000000" pitchFamily="2" charset="0"/>
+              <a:ea typeface="Linux Libertine" panose="02000503000000000000" pitchFamily="2" charset="0"/>
+              <a:cs typeface="Linux Libertine" panose="02000503000000000000" pitchFamily="2" charset="0"/>
+            </a:endParaRPr>
           </a:p>
           <a:p>
             <a:pPr marL="342900" indent="-342900">
               <a:buAutoNum type="arabicParenBoth"/>
             </a:pPr>
             <a:r>
-              <a:rPr lang="de-DE" dirty="0" smtClean="0"/>
+              <a:rPr lang="de-DE" sz="1400" dirty="0" smtClean="0">
+                <a:latin typeface="Linux Libertine" panose="02000503000000000000" pitchFamily="2" charset="0"/>
+                <a:ea typeface="Linux Libertine" panose="02000503000000000000" pitchFamily="2" charset="0"/>
+                <a:cs typeface="Linux Libertine" panose="02000503000000000000" pitchFamily="2" charset="0"/>
+              </a:rPr>
               <a:t> Isolation </a:t>
             </a:r>
             <a:r>
-              <a:rPr lang="de-DE" dirty="0" err="1" smtClean="0"/>
+              <a:rPr lang="de-DE" sz="1400" dirty="0" err="1" smtClean="0">
+                <a:latin typeface="Linux Libertine" panose="02000503000000000000" pitchFamily="2" charset="0"/>
+                <a:ea typeface="Linux Libertine" panose="02000503000000000000" pitchFamily="2" charset="0"/>
+                <a:cs typeface="Linux Libertine" panose="02000503000000000000" pitchFamily="2" charset="0"/>
+              </a:rPr>
               <a:t>for</a:t>
             </a:r>
             <a:r>
-              <a:rPr lang="de-DE" dirty="0" smtClean="0"/>
+              <a:rPr lang="de-DE" sz="1400" dirty="0" smtClean="0">
+                <a:latin typeface="Linux Libertine" panose="02000503000000000000" pitchFamily="2" charset="0"/>
+                <a:ea typeface="Linux Libertine" panose="02000503000000000000" pitchFamily="2" charset="0"/>
+                <a:cs typeface="Linux Libertine" panose="02000503000000000000" pitchFamily="2" charset="0"/>
+              </a:rPr>
               <a:t> </a:t>
             </a:r>
             <a:r>
-              <a:rPr lang="de-DE" b="1" dirty="0" err="1"/>
+              <a:rPr lang="de-DE" sz="1400" b="1" dirty="0" err="1">
+                <a:latin typeface="Linux Libertine" panose="02000503000000000000" pitchFamily="2" charset="0"/>
+                <a:ea typeface="Linux Libertine" panose="02000503000000000000" pitchFamily="2" charset="0"/>
+                <a:cs typeface="Linux Libertine" panose="02000503000000000000" pitchFamily="2" charset="0"/>
+              </a:rPr>
               <a:t>Versioned</a:t>
             </a:r>
             <a:r>
-              <a:rPr lang="de-DE" b="1" dirty="0"/>
+              <a:rPr lang="de-DE" sz="1400" b="1" dirty="0">
+                <a:latin typeface="Linux Libertine" panose="02000503000000000000" pitchFamily="2" charset="0"/>
+                <a:ea typeface="Linux Libertine" panose="02000503000000000000" pitchFamily="2" charset="0"/>
+                <a:cs typeface="Linux Libertine" panose="02000503000000000000" pitchFamily="2" charset="0"/>
+              </a:rPr>
               <a:t> </a:t>
             </a:r>
             <a:r>
-              <a:rPr lang="de-DE" b="1" dirty="0" err="1"/>
+              <a:rPr lang="de-DE" sz="1400" b="1" dirty="0" err="1">
+                <a:latin typeface="Linux Libertine" panose="02000503000000000000" pitchFamily="2" charset="0"/>
+                <a:ea typeface="Linux Libertine" panose="02000503000000000000" pitchFamily="2" charset="0"/>
+                <a:cs typeface="Linux Libertine" panose="02000503000000000000" pitchFamily="2" charset="0"/>
+              </a:rPr>
               <a:t>Dependency</a:t>
             </a:r>
             <a:r>
-              <a:rPr lang="de-DE" b="1" dirty="0"/>
+              <a:rPr lang="de-DE" sz="1400" b="1" dirty="0">
+                <a:latin typeface="Linux Libertine" panose="02000503000000000000" pitchFamily="2" charset="0"/>
+                <a:ea typeface="Linux Libertine" panose="02000503000000000000" pitchFamily="2" charset="0"/>
+                <a:cs typeface="Linux Libertine" panose="02000503000000000000" pitchFamily="2" charset="0"/>
+              </a:rPr>
               <a:t> Management</a:t>
             </a:r>
-            <a:endParaRPr lang="de-DE" b="1" dirty="0" smtClean="0"/>
+            <a:endParaRPr lang="de-DE" sz="1400" b="1" dirty="0" smtClean="0">
+              <a:latin typeface="Linux Libertine" panose="02000503000000000000" pitchFamily="2" charset="0"/>
+              <a:ea typeface="Linux Libertine" panose="02000503000000000000" pitchFamily="2" charset="0"/>
+              <a:cs typeface="Linux Libertine" panose="02000503000000000000" pitchFamily="2" charset="0"/>
+            </a:endParaRPr>
           </a:p>
           <a:p>
             <a:pPr marL="342900" indent="-342900">
               <a:buAutoNum type="arabicParenBoth"/>
             </a:pPr>
-            <a:endParaRPr lang="de-DE" b="1" dirty="0" smtClean="0"/>
-          </a:p>
-          <a:p>
-            <a:r>
-              <a:rPr lang="de-DE" dirty="0" smtClean="0"/>
-              <a:t>(*) Adaptation </a:t>
-            </a:r>
-            <a:r>
-              <a:rPr lang="de-DE" dirty="0" err="1"/>
+            <a:endParaRPr lang="de-DE" sz="1400" dirty="0" smtClean="0">
+              <a:latin typeface="Linux Libertine" panose="02000503000000000000" pitchFamily="2" charset="0"/>
+              <a:ea typeface="Linux Libertine" panose="02000503000000000000" pitchFamily="2" charset="0"/>
+              <a:cs typeface="Linux Libertine" panose="02000503000000000000" pitchFamily="2" charset="0"/>
+            </a:endParaRPr>
+          </a:p>
+          <a:p>
+            <a:r>
+              <a:rPr lang="de-DE" sz="1400" dirty="0" smtClean="0">
+                <a:latin typeface="Linux Libertine" panose="02000503000000000000" pitchFamily="2" charset="0"/>
+                <a:ea typeface="Linux Libertine" panose="02000503000000000000" pitchFamily="2" charset="0"/>
+                <a:cs typeface="Linux Libertine" panose="02000503000000000000" pitchFamily="2" charset="0"/>
+              </a:rPr>
+              <a:t>(*)  </a:t>
+            </a:r>
+            <a:r>
+              <a:rPr lang="de-DE" sz="1400" dirty="0" smtClean="0">
+                <a:latin typeface="Linux Libertine" panose="02000503000000000000" pitchFamily="2" charset="0"/>
+                <a:ea typeface="Linux Libertine" panose="02000503000000000000" pitchFamily="2" charset="0"/>
+                <a:cs typeface="Linux Libertine" panose="02000503000000000000" pitchFamily="2" charset="0"/>
+              </a:rPr>
+              <a:t>  Adaptation </a:t>
+            </a:r>
+            <a:r>
+              <a:rPr lang="de-DE" sz="1400" dirty="0" err="1">
+                <a:latin typeface="Linux Libertine" panose="02000503000000000000" pitchFamily="2" charset="0"/>
+                <a:ea typeface="Linux Libertine" panose="02000503000000000000" pitchFamily="2" charset="0"/>
+                <a:cs typeface="Linux Libertine" panose="02000503000000000000" pitchFamily="2" charset="0"/>
+              </a:rPr>
               <a:t>and</a:t>
             </a:r>
             <a:r>
-              <a:rPr lang="de-DE" dirty="0"/>
+              <a:rPr lang="de-DE" sz="1400" dirty="0">
+                <a:latin typeface="Linux Libertine" panose="02000503000000000000" pitchFamily="2" charset="0"/>
+                <a:ea typeface="Linux Libertine" panose="02000503000000000000" pitchFamily="2" charset="0"/>
+                <a:cs typeface="Linux Libertine" panose="02000503000000000000" pitchFamily="2" charset="0"/>
+              </a:rPr>
               <a:t> </a:t>
             </a:r>
             <a:r>
-              <a:rPr lang="de-DE" dirty="0" err="1" smtClean="0"/>
+              <a:rPr lang="de-DE" sz="1400" dirty="0" err="1" smtClean="0">
+                <a:latin typeface="Linux Libertine" panose="02000503000000000000" pitchFamily="2" charset="0"/>
+                <a:ea typeface="Linux Libertine" panose="02000503000000000000" pitchFamily="2" charset="0"/>
+                <a:cs typeface="Linux Libertine" panose="02000503000000000000" pitchFamily="2" charset="0"/>
+              </a:rPr>
               <a:t>further</a:t>
             </a:r>
             <a:r>
-              <a:rPr lang="de-DE" dirty="0" smtClean="0"/>
+              <a:rPr lang="de-DE" sz="1400" dirty="0" smtClean="0">
+                <a:latin typeface="Linux Libertine" panose="02000503000000000000" pitchFamily="2" charset="0"/>
+                <a:ea typeface="Linux Libertine" panose="02000503000000000000" pitchFamily="2" charset="0"/>
+                <a:cs typeface="Linux Libertine" panose="02000503000000000000" pitchFamily="2" charset="0"/>
+              </a:rPr>
               <a:t> </a:t>
             </a:r>
             <a:r>
-              <a:rPr lang="de-DE" dirty="0" err="1" smtClean="0"/>
+              <a:rPr lang="de-DE" sz="1400" dirty="0" err="1" smtClean="0">
+                <a:latin typeface="Linux Libertine" panose="02000503000000000000" pitchFamily="2" charset="0"/>
+                <a:ea typeface="Linux Libertine" panose="02000503000000000000" pitchFamily="2" charset="0"/>
+                <a:cs typeface="Linux Libertine" panose="02000503000000000000" pitchFamily="2" charset="0"/>
+              </a:rPr>
               <a:t>development</a:t>
             </a:r>
-            <a:endParaRPr lang="de-DE" dirty="0"/>
+            <a:endParaRPr lang="de-DE" sz="1400" dirty="0">
+              <a:latin typeface="Linux Libertine" panose="02000503000000000000" pitchFamily="2" charset="0"/>
+              <a:ea typeface="Linux Libertine" panose="02000503000000000000" pitchFamily="2" charset="0"/>
+              <a:cs typeface="Linux Libertine" panose="02000503000000000000" pitchFamily="2" charset="0"/>
+            </a:endParaRPr>
           </a:p>
         </p:txBody>
       </p:sp>
@@ -8279,7 +8917,11 @@
           <a:lstStyle/>
           <a:p>
             <a:pPr algn="ctr"/>
-            <a:endParaRPr lang="en-US"/>
+            <a:endParaRPr lang="en-US">
+              <a:latin typeface="Linux Libertine" panose="02000503000000000000" pitchFamily="2" charset="0"/>
+              <a:ea typeface="Linux Libertine" panose="02000503000000000000" pitchFamily="2" charset="0"/>
+              <a:cs typeface="Linux Libertine" panose="02000503000000000000" pitchFamily="2" charset="0"/>
+            </a:endParaRPr>
           </a:p>
         </p:txBody>
       </p:sp>
@@ -8292,9 +8934,9 @@
         <p:grpSpPr>
           <a:xfrm>
             <a:off x="2929124" y="3232476"/>
-            <a:ext cx="7229728" cy="296615"/>
+            <a:ext cx="7229728" cy="307777"/>
             <a:chOff x="1773609" y="1445199"/>
-            <a:chExt cx="4163674" cy="307777"/>
+            <a:chExt cx="4163674" cy="319359"/>
           </a:xfrm>
         </p:grpSpPr>
         <p:sp>
@@ -8305,8 +8947,8 @@
           </p:nvSpPr>
           <p:spPr>
             <a:xfrm>
-              <a:off x="5392781" y="1445199"/>
-              <a:ext cx="519694" cy="307777"/>
+              <a:off x="5618717" y="1445199"/>
+              <a:ext cx="293758" cy="319359"/>
             </a:xfrm>
             <a:prstGeom prst="rect">
               <a:avLst/>
@@ -8338,10 +8980,18 @@
             <a:p>
               <a:pPr algn="r"/>
               <a:r>
-                <a:rPr lang="de-DE" sz="1400" dirty="0" smtClean="0"/>
+                <a:rPr lang="de-DE" sz="1400" dirty="0" smtClean="0">
+                  <a:latin typeface="Linux Libertine" panose="02000503000000000000" pitchFamily="2" charset="0"/>
+                  <a:ea typeface="Linux Libertine" panose="02000503000000000000" pitchFamily="2" charset="0"/>
+                  <a:cs typeface="Linux Libertine" panose="02000503000000000000" pitchFamily="2" charset="0"/>
+                </a:rPr>
                 <a:t>time</a:t>
               </a:r>
-              <a:endParaRPr lang="en-US" sz="1400" dirty="0"/>
+              <a:endParaRPr lang="en-US" sz="1400" dirty="0">
+                <a:latin typeface="Linux Libertine" panose="02000503000000000000" pitchFamily="2" charset="0"/>
+                <a:ea typeface="Linux Libertine" panose="02000503000000000000" pitchFamily="2" charset="0"/>
+                <a:cs typeface="Linux Libertine" panose="02000503000000000000" pitchFamily="2" charset="0"/>
+              </a:endParaRPr>
             </a:p>
           </p:txBody>
         </p:sp>
@@ -8531,6 +9181,9 @@
               <a:solidFill>
                 <a:schemeClr val="tx1"/>
               </a:solidFill>
+              <a:latin typeface="Linux Libertine" panose="02000503000000000000" pitchFamily="2" charset="0"/>
+              <a:ea typeface="Linux Libertine" panose="02000503000000000000" pitchFamily="2" charset="0"/>
+              <a:cs typeface="Linux Libertine" panose="02000503000000000000" pitchFamily="2" charset="0"/>
             </a:endParaRPr>
           </a:p>
         </p:txBody>
@@ -9095,6 +9748,9 @@
                 <a:solidFill>
                   <a:schemeClr val="tx1"/>
                 </a:solidFill>
+                <a:latin typeface="Linux Libertine" panose="02000503000000000000" pitchFamily="2" charset="0"/>
+                <a:ea typeface="Linux Libertine" panose="02000503000000000000" pitchFamily="2" charset="0"/>
+                <a:cs typeface="Linux Libertine" panose="02000503000000000000" pitchFamily="2" charset="0"/>
               </a:endParaRPr>
             </a:p>
           </p:txBody>
@@ -9107,8 +9763,8 @@
           </p:nvSpPr>
           <p:spPr>
             <a:xfrm rot="16200000">
-              <a:off x="9769634" y="4796835"/>
-              <a:ext cx="573427" cy="307777"/>
+              <a:off x="9749212" y="4796835"/>
+              <a:ext cx="614271" cy="307777"/>
             </a:xfrm>
             <a:prstGeom prst="rect">
               <a:avLst/>
@@ -9121,14 +9777,26 @@
             <a:lstStyle/>
             <a:p>
               <a:r>
-                <a:rPr lang="de-DE" sz="1100" b="1" dirty="0" smtClean="0"/>
+                <a:rPr lang="de-DE" sz="1100" b="1" dirty="0" smtClean="0">
+                  <a:latin typeface="Linux Libertine" panose="02000503000000000000" pitchFamily="2" charset="0"/>
+                  <a:ea typeface="Linux Libertine" panose="02000503000000000000" pitchFamily="2" charset="0"/>
+                  <a:cs typeface="Linux Libertine" panose="02000503000000000000" pitchFamily="2" charset="0"/>
+                </a:rPr>
                 <a:t># </a:t>
               </a:r>
               <a:r>
-                <a:rPr lang="de-DE" sz="1400" b="1" dirty="0" smtClean="0"/>
+                <a:rPr lang="de-DE" sz="1400" b="1" dirty="0" smtClean="0">
+                  <a:latin typeface="Linux Libertine" panose="02000503000000000000" pitchFamily="2" charset="0"/>
+                  <a:ea typeface="Linux Libertine" panose="02000503000000000000" pitchFamily="2" charset="0"/>
+                  <a:cs typeface="Linux Libertine" panose="02000503000000000000" pitchFamily="2" charset="0"/>
+                </a:rPr>
                 <a:t>LOC</a:t>
               </a:r>
-              <a:endParaRPr lang="en-US" sz="1400" b="1" dirty="0"/>
+              <a:endParaRPr lang="en-US" sz="1400" b="1" dirty="0">
+                <a:latin typeface="Linux Libertine" panose="02000503000000000000" pitchFamily="2" charset="0"/>
+                <a:ea typeface="Linux Libertine" panose="02000503000000000000" pitchFamily="2" charset="0"/>
+                <a:cs typeface="Linux Libertine" panose="02000503000000000000" pitchFamily="2" charset="0"/>
+              </a:endParaRPr>
             </a:p>
           </p:txBody>
         </p:sp>
@@ -9311,6 +9979,9 @@
                 <a:solidFill>
                   <a:schemeClr val="tx1"/>
                 </a:solidFill>
+                <a:latin typeface="Linux Libertine" panose="02000503000000000000" pitchFamily="2" charset="0"/>
+                <a:ea typeface="Linux Libertine" panose="02000503000000000000" pitchFamily="2" charset="0"/>
+                <a:cs typeface="Linux Libertine" panose="02000503000000000000" pitchFamily="2" charset="0"/>
               </a:endParaRPr>
             </a:p>
           </p:txBody>
@@ -9361,6 +10032,9 @@
                 <a:solidFill>
                   <a:schemeClr val="tx1"/>
                 </a:solidFill>
+                <a:latin typeface="Linux Libertine" panose="02000503000000000000" pitchFamily="2" charset="0"/>
+                <a:ea typeface="Linux Libertine" panose="02000503000000000000" pitchFamily="2" charset="0"/>
+                <a:cs typeface="Linux Libertine" panose="02000503000000000000" pitchFamily="2" charset="0"/>
               </a:endParaRPr>
             </a:p>
           </p:txBody>

</xml_diff>